<commit_message>
Uploaded new images of plots needed for presentation
Uploaded new images of plots needed for presentation.

Added and updated powerpoint presentation.

Fixed minor issues with notebook 5 research and analysis and updated dataframe for analysis
</commit_message>
<xml_diff>
--- a/Capstone 2/NYC_house_ppt.pptx
+++ b/Capstone 2/NYC_house_ppt.pptx
@@ -10,15 +10,16 @@
     <p:sldId id="258" r:id="rId4"/>
     <p:sldId id="259" r:id="rId5"/>
     <p:sldId id="260" r:id="rId6"/>
-    <p:sldId id="262" r:id="rId7"/>
+    <p:sldId id="270" r:id="rId7"/>
     <p:sldId id="261" r:id="rId8"/>
-    <p:sldId id="263" r:id="rId9"/>
-    <p:sldId id="264" r:id="rId10"/>
-    <p:sldId id="265" r:id="rId11"/>
-    <p:sldId id="267" r:id="rId12"/>
-    <p:sldId id="266" r:id="rId13"/>
-    <p:sldId id="268" r:id="rId14"/>
-    <p:sldId id="269" r:id="rId15"/>
+    <p:sldId id="262" r:id="rId9"/>
+    <p:sldId id="263" r:id="rId10"/>
+    <p:sldId id="264" r:id="rId11"/>
+    <p:sldId id="265" r:id="rId12"/>
+    <p:sldId id="267" r:id="rId13"/>
+    <p:sldId id="266" r:id="rId14"/>
+    <p:sldId id="268" r:id="rId15"/>
+    <p:sldId id="269" r:id="rId16"/>
   </p:sldIdLst>
   <p:sldSz cx="12192000" cy="6858000"/>
   <p:notesSz cx="6858000" cy="9144000"/>
@@ -117,6 +118,11 @@
       </a:defRPr>
     </a:lvl9pPr>
   </p:defaultTextStyle>
+  <p:extLst>
+    <p:ext uri="{EFAFB233-063F-42B5-8137-9DF3F51BA10A}">
+      <p15:sldGuideLst xmlns:p15="http://schemas.microsoft.com/office/powerpoint/2012/main"/>
+    </p:ext>
+  </p:extLst>
 </p:presentation>
 </file>
 
@@ -11351,7 +11357,7 @@
           <a:p>
             <a:fld id="{02AC24A9-CCB6-4F8D-B8DB-C2F3692CFA5A}" type="datetimeFigureOut">
               <a:rPr lang="en-US" smtClean="0"/>
-              <a:t>9/19/2021</a:t>
+              <a:t>9/27/2021</a:t>
             </a:fld>
             <a:endParaRPr lang="en-US" dirty="0"/>
           </a:p>
@@ -11721,7 +11727,7 @@
           <a:p>
             <a:fld id="{02AC24A9-CCB6-4F8D-B8DB-C2F3692CFA5A}" type="datetimeFigureOut">
               <a:rPr lang="en-US" smtClean="0"/>
-              <a:t>9/19/2021</a:t>
+              <a:t>9/27/2021</a:t>
             </a:fld>
             <a:endParaRPr lang="en-US"/>
           </a:p>
@@ -11930,7 +11936,7 @@
           <a:p>
             <a:fld id="{02AC24A9-CCB6-4F8D-B8DB-C2F3692CFA5A}" type="datetimeFigureOut">
               <a:rPr lang="en-US" smtClean="0"/>
-              <a:t>9/19/2021</a:t>
+              <a:t>9/27/2021</a:t>
             </a:fld>
             <a:endParaRPr lang="en-US"/>
           </a:p>
@@ -12400,7 +12406,7 @@
           <a:p>
             <a:fld id="{02AC24A9-CCB6-4F8D-B8DB-C2F3692CFA5A}" type="datetimeFigureOut">
               <a:rPr lang="en-US" smtClean="0"/>
-              <a:t>9/19/2021</a:t>
+              <a:t>9/27/2021</a:t>
             </a:fld>
             <a:endParaRPr lang="en-US"/>
           </a:p>
@@ -12854,7 +12860,7 @@
           <a:p>
             <a:fld id="{02AC24A9-CCB6-4F8D-B8DB-C2F3692CFA5A}" type="datetimeFigureOut">
               <a:rPr lang="en-US" smtClean="0"/>
-              <a:t>9/19/2021</a:t>
+              <a:t>9/27/2021</a:t>
             </a:fld>
             <a:endParaRPr lang="en-US"/>
           </a:p>
@@ -13386,7 +13392,7 @@
           <a:p>
             <a:fld id="{02AC24A9-CCB6-4F8D-B8DB-C2F3692CFA5A}" type="datetimeFigureOut">
               <a:rPr lang="en-US" smtClean="0"/>
-              <a:t>9/19/2021</a:t>
+              <a:t>9/27/2021</a:t>
             </a:fld>
             <a:endParaRPr lang="en-US"/>
           </a:p>
@@ -14085,7 +14091,7 @@
           <a:p>
             <a:fld id="{02AC24A9-CCB6-4F8D-B8DB-C2F3692CFA5A}" type="datetimeFigureOut">
               <a:rPr lang="en-US" smtClean="0"/>
-              <a:t>9/19/2021</a:t>
+              <a:t>9/27/2021</a:t>
             </a:fld>
             <a:endParaRPr lang="en-US"/>
           </a:p>
@@ -14414,7 +14420,7 @@
           <a:p>
             <a:fld id="{02AC24A9-CCB6-4F8D-B8DB-C2F3692CFA5A}" type="datetimeFigureOut">
               <a:rPr lang="en-US" smtClean="0"/>
-              <a:t>9/19/2021</a:t>
+              <a:t>9/27/2021</a:t>
             </a:fld>
             <a:endParaRPr lang="en-US"/>
           </a:p>
@@ -14527,7 +14533,7 @@
           <a:p>
             <a:fld id="{02AC24A9-CCB6-4F8D-B8DB-C2F3692CFA5A}" type="datetimeFigureOut">
               <a:rPr lang="en-US" smtClean="0"/>
-              <a:t>9/19/2021</a:t>
+              <a:t>9/27/2021</a:t>
             </a:fld>
             <a:endParaRPr lang="en-US"/>
           </a:p>
@@ -15022,7 +15028,7 @@
           <a:p>
             <a:fld id="{02AC24A9-CCB6-4F8D-B8DB-C2F3692CFA5A}" type="datetimeFigureOut">
               <a:rPr lang="en-US" smtClean="0"/>
-              <a:t>9/19/2021</a:t>
+              <a:t>9/27/2021</a:t>
             </a:fld>
             <a:endParaRPr lang="en-US" dirty="0"/>
           </a:p>
@@ -15499,7 +15505,7 @@
           <a:p>
             <a:fld id="{02AC24A9-CCB6-4F8D-B8DB-C2F3692CFA5A}" type="datetimeFigureOut">
               <a:rPr lang="en-US" smtClean="0"/>
-              <a:t>9/19/2021</a:t>
+              <a:t>9/27/2021</a:t>
             </a:fld>
             <a:endParaRPr lang="en-US"/>
           </a:p>
@@ -15742,7 +15748,7 @@
           <a:p>
             <a:fld id="{02AC24A9-CCB6-4F8D-B8DB-C2F3692CFA5A}" type="datetimeFigureOut">
               <a:rPr lang="en-US" smtClean="0"/>
-              <a:t>9/19/2021</a:t>
+              <a:t>9/27/2021</a:t>
             </a:fld>
             <a:endParaRPr lang="en-US"/>
           </a:p>
@@ -16859,6 +16865,517 @@
           <a:chExt cx="0" cy="0"/>
         </a:xfrm>
       </p:grpSpPr>
+      <p:sp useBgFill="1">
+        <p:nvSpPr>
+          <p:cNvPr id="43" name="Rectangle 42">
+            <a:extLst>
+              <a:ext uri="{FF2B5EF4-FFF2-40B4-BE49-F238E27FC236}">
+                <a16:creationId xmlns:a16="http://schemas.microsoft.com/office/drawing/2014/main" id="{2550BE34-C2B8-49B8-8519-67A8CAD51AE9}"/>
+              </a:ext>
+              <a:ext uri="{C183D7F6-B498-43B3-948B-1728B52AA6E4}">
+                <adec:decorative xmlns:adec="http://schemas.microsoft.com/office/drawing/2017/decorative" val="1"/>
+              </a:ext>
+            </a:extLst>
+          </p:cNvPr>
+          <p:cNvSpPr>
+            <a:spLocks noGrp="1" noRot="1" noChangeAspect="1" noMove="1" noResize="1" noEditPoints="1" noAdjustHandles="1" noChangeArrowheads="1" noChangeShapeType="1" noTextEdit="1"/>
+          </p:cNvSpPr>
+          <p:nvPr>
+            <p:extLst>
+              <p:ext uri="{386F3935-93C4-4BCD-93E2-E3B085C9AB24}">
+                <p16:designElem xmlns:p16="http://schemas.microsoft.com/office/powerpoint/2015/main" val="1"/>
+              </p:ext>
+            </p:extLst>
+          </p:nvPr>
+        </p:nvSpPr>
+        <p:spPr>
+          <a:xfrm>
+            <a:off x="0" y="0"/>
+            <a:ext cx="12192000" cy="6858000"/>
+          </a:xfrm>
+          <a:prstGeom prst="rect">
+            <a:avLst/>
+          </a:prstGeom>
+          <a:ln>
+            <a:noFill/>
+          </a:ln>
+        </p:spPr>
+        <p:style>
+          <a:lnRef idx="2">
+            <a:schemeClr val="accent1">
+              <a:shade val="50000"/>
+            </a:schemeClr>
+          </a:lnRef>
+          <a:fillRef idx="1">
+            <a:schemeClr val="accent1"/>
+          </a:fillRef>
+          <a:effectRef idx="0">
+            <a:schemeClr val="accent1"/>
+          </a:effectRef>
+          <a:fontRef idx="minor">
+            <a:schemeClr val="lt1"/>
+          </a:fontRef>
+        </p:style>
+        <p:txBody>
+          <a:bodyPr rtlCol="0" anchor="ctr"/>
+          <a:lstStyle/>
+          <a:p>
+            <a:pPr algn="ctr"/>
+            <a:endParaRPr lang="en-US"/>
+          </a:p>
+        </p:txBody>
+      </p:sp>
+      <p:sp useBgFill="1">
+        <p:nvSpPr>
+          <p:cNvPr id="45" name="Rectangle 44">
+            <a:extLst>
+              <a:ext uri="{FF2B5EF4-FFF2-40B4-BE49-F238E27FC236}">
+                <a16:creationId xmlns:a16="http://schemas.microsoft.com/office/drawing/2014/main" id="{A7457DD9-5A45-400A-AB4B-4B4EDECA25F1}"/>
+              </a:ext>
+              <a:ext uri="{C183D7F6-B498-43B3-948B-1728B52AA6E4}">
+                <adec:decorative xmlns:adec="http://schemas.microsoft.com/office/drawing/2017/decorative" val="1"/>
+              </a:ext>
+            </a:extLst>
+          </p:cNvPr>
+          <p:cNvSpPr>
+            <a:spLocks noGrp="1" noRot="1" noChangeAspect="1" noMove="1" noResize="1" noEditPoints="1" noAdjustHandles="1" noChangeArrowheads="1" noChangeShapeType="1" noTextEdit="1"/>
+          </p:cNvSpPr>
+          <p:nvPr>
+            <p:extLst>
+              <p:ext uri="{386F3935-93C4-4BCD-93E2-E3B085C9AB24}">
+                <p16:designElem xmlns:p16="http://schemas.microsoft.com/office/powerpoint/2015/main" val="1"/>
+              </p:ext>
+            </p:extLst>
+          </p:nvPr>
+        </p:nvSpPr>
+        <p:spPr>
+          <a:xfrm>
+            <a:off x="554416" y="365125"/>
+            <a:ext cx="11167447" cy="2089317"/>
+          </a:xfrm>
+          <a:prstGeom prst="rect">
+            <a:avLst/>
+          </a:prstGeom>
+          <a:ln w="12700">
+            <a:solidFill>
+              <a:schemeClr val="tx2">
+                <a:lumMod val="10000"/>
+                <a:lumOff val="90000"/>
+              </a:schemeClr>
+            </a:solidFill>
+          </a:ln>
+          <a:effectLst>
+            <a:outerShdw blurRad="50800" dist="38100" dir="2700000" algn="tl" rotWithShape="0">
+              <a:schemeClr val="bg2">
+                <a:lumMod val="85000"/>
+                <a:alpha val="30000"/>
+              </a:schemeClr>
+            </a:outerShdw>
+          </a:effectLst>
+        </p:spPr>
+        <p:style>
+          <a:lnRef idx="2">
+            <a:schemeClr val="accent1">
+              <a:shade val="50000"/>
+            </a:schemeClr>
+          </a:lnRef>
+          <a:fillRef idx="1">
+            <a:schemeClr val="accent1"/>
+          </a:fillRef>
+          <a:effectRef idx="0">
+            <a:schemeClr val="accent1"/>
+          </a:effectRef>
+          <a:fontRef idx="minor">
+            <a:schemeClr val="lt1"/>
+          </a:fontRef>
+        </p:style>
+        <p:txBody>
+          <a:bodyPr rtlCol="0" anchor="ctr"/>
+          <a:lstStyle/>
+          <a:p>
+            <a:pPr marL="0" marR="0" lvl="0" indent="0" algn="ctr" defTabSz="914400" rtl="0" eaLnBrk="1" fontAlgn="auto" latinLnBrk="0" hangingPunct="1">
+              <a:lnSpc>
+                <a:spcPct val="100000"/>
+              </a:lnSpc>
+              <a:spcBef>
+                <a:spcPts val="0"/>
+              </a:spcBef>
+              <a:spcAft>
+                <a:spcPts val="0"/>
+              </a:spcAft>
+              <a:buClrTx/>
+              <a:buSzTx/>
+              <a:buFontTx/>
+              <a:buNone/>
+              <a:tabLst/>
+              <a:defRPr/>
+            </a:pPr>
+            <a:endParaRPr kumimoji="0" lang="en-US" sz="1800" b="0" i="0" u="none" strike="noStrike" kern="1200" cap="none" spc="0" normalizeH="0" baseline="0" noProof="0">
+              <a:ln>
+                <a:noFill/>
+              </a:ln>
+              <a:solidFill>
+                <a:prstClr val="white"/>
+              </a:solidFill>
+              <a:effectLst/>
+              <a:uLnTx/>
+              <a:uFillTx/>
+              <a:latin typeface="Calibri" panose="020F0502020204030204"/>
+              <a:ea typeface="+mn-ea"/>
+              <a:cs typeface="+mn-cs"/>
+            </a:endParaRPr>
+          </a:p>
+        </p:txBody>
+      </p:sp>
+      <p:sp>
+        <p:nvSpPr>
+          <p:cNvPr id="2" name="Title 1">
+            <a:extLst>
+              <a:ext uri="{FF2B5EF4-FFF2-40B4-BE49-F238E27FC236}">
+                <a16:creationId xmlns:a16="http://schemas.microsoft.com/office/drawing/2014/main" id="{785B5E1D-06A2-4A57-ACE0-34D4044AAE28}"/>
+              </a:ext>
+            </a:extLst>
+          </p:cNvPr>
+          <p:cNvSpPr>
+            <a:spLocks noGrp="1"/>
+          </p:cNvSpPr>
+          <p:nvPr>
+            <p:ph type="title"/>
+          </p:nvPr>
+        </p:nvSpPr>
+        <p:spPr>
+          <a:xfrm>
+            <a:off x="1046746" y="586822"/>
+            <a:ext cx="3537285" cy="1645920"/>
+          </a:xfrm>
+        </p:spPr>
+        <p:txBody>
+          <a:bodyPr>
+            <a:normAutofit/>
+          </a:bodyPr>
+          <a:lstStyle/>
+          <a:p>
+            <a:r>
+              <a:rPr lang="en-US" sz="3200" dirty="0"/>
+              <a:t>Impact of Built Year</a:t>
+            </a:r>
+          </a:p>
+        </p:txBody>
+      </p:sp>
+      <p:sp>
+        <p:nvSpPr>
+          <p:cNvPr id="47" name="Rectangle 46">
+            <a:extLst>
+              <a:ext uri="{FF2B5EF4-FFF2-40B4-BE49-F238E27FC236}">
+                <a16:creationId xmlns:a16="http://schemas.microsoft.com/office/drawing/2014/main" id="{441CF7D6-A660-431A-B0BB-140A0D5556B6}"/>
+              </a:ext>
+              <a:ext uri="{C183D7F6-B498-43B3-948B-1728B52AA6E4}">
+                <adec:decorative xmlns:adec="http://schemas.microsoft.com/office/drawing/2017/decorative" val="1"/>
+              </a:ext>
+            </a:extLst>
+          </p:cNvPr>
+          <p:cNvSpPr>
+            <a:spLocks noGrp="1" noRot="1" noChangeAspect="1" noMove="1" noResize="1" noEditPoints="1" noAdjustHandles="1" noChangeArrowheads="1" noChangeShapeType="1" noTextEdit="1"/>
+          </p:cNvSpPr>
+          <p:nvPr>
+            <p:extLst>
+              <p:ext uri="{386F3935-93C4-4BCD-93E2-E3B085C9AB24}">
+                <p16:designElem xmlns:p16="http://schemas.microsoft.com/office/powerpoint/2015/main" val="1"/>
+              </p:ext>
+            </p:extLst>
+          </p:nvPr>
+        </p:nvSpPr>
+        <p:spPr>
+          <a:xfrm>
+            <a:off x="490408" y="1057739"/>
+            <a:ext cx="128016" cy="704088"/>
+          </a:xfrm>
+          <a:prstGeom prst="rect">
+            <a:avLst/>
+          </a:prstGeom>
+          <a:solidFill>
+            <a:schemeClr val="accent1"/>
+          </a:solidFill>
+          <a:ln>
+            <a:noFill/>
+          </a:ln>
+        </p:spPr>
+        <p:style>
+          <a:lnRef idx="2">
+            <a:schemeClr val="accent1">
+              <a:shade val="50000"/>
+            </a:schemeClr>
+          </a:lnRef>
+          <a:fillRef idx="1">
+            <a:schemeClr val="accent1"/>
+          </a:fillRef>
+          <a:effectRef idx="0">
+            <a:schemeClr val="accent1"/>
+          </a:effectRef>
+          <a:fontRef idx="minor">
+            <a:schemeClr val="lt1"/>
+          </a:fontRef>
+        </p:style>
+        <p:txBody>
+          <a:bodyPr rtlCol="0" anchor="ctr"/>
+          <a:lstStyle/>
+          <a:p>
+            <a:pPr marL="0" marR="0" lvl="0" indent="0" algn="ctr" defTabSz="914400" rtl="0" eaLnBrk="1" fontAlgn="auto" latinLnBrk="0" hangingPunct="1">
+              <a:lnSpc>
+                <a:spcPct val="100000"/>
+              </a:lnSpc>
+              <a:spcBef>
+                <a:spcPts val="0"/>
+              </a:spcBef>
+              <a:spcAft>
+                <a:spcPts val="0"/>
+              </a:spcAft>
+              <a:buClrTx/>
+              <a:buSzTx/>
+              <a:buFontTx/>
+              <a:buNone/>
+              <a:tabLst/>
+              <a:defRPr/>
+            </a:pPr>
+            <a:endParaRPr kumimoji="0" lang="en-US" sz="1800" b="0" i="0" u="none" strike="noStrike" kern="1200" cap="none" spc="0" normalizeH="0" baseline="0" noProof="0" dirty="0">
+              <a:ln>
+                <a:noFill/>
+              </a:ln>
+              <a:solidFill>
+                <a:prstClr val="white"/>
+              </a:solidFill>
+              <a:effectLst/>
+              <a:uLnTx/>
+              <a:uFillTx/>
+              <a:latin typeface="Calibri" panose="020F0502020204030204"/>
+              <a:ea typeface="+mn-ea"/>
+              <a:cs typeface="+mn-cs"/>
+            </a:endParaRPr>
+          </a:p>
+        </p:txBody>
+      </p:sp>
+      <p:sp>
+        <p:nvSpPr>
+          <p:cNvPr id="49" name="Rectangle 48">
+            <a:extLst>
+              <a:ext uri="{FF2B5EF4-FFF2-40B4-BE49-F238E27FC236}">
+                <a16:creationId xmlns:a16="http://schemas.microsoft.com/office/drawing/2014/main" id="{0570A85B-3810-4F95-97B0-CBF4CCDB381C}"/>
+              </a:ext>
+              <a:ext uri="{C183D7F6-B498-43B3-948B-1728B52AA6E4}">
+                <adec:decorative xmlns:adec="http://schemas.microsoft.com/office/drawing/2017/decorative" val="1"/>
+              </a:ext>
+            </a:extLst>
+          </p:cNvPr>
+          <p:cNvSpPr>
+            <a:spLocks noGrp="1" noRot="1" noChangeAspect="1" noMove="1" noResize="1" noEditPoints="1" noAdjustHandles="1" noChangeArrowheads="1" noChangeShapeType="1" noTextEdit="1"/>
+          </p:cNvSpPr>
+          <p:nvPr>
+            <p:extLst>
+              <p:ext uri="{386F3935-93C4-4BCD-93E2-E3B085C9AB24}">
+                <p16:designElem xmlns:p16="http://schemas.microsoft.com/office/powerpoint/2015/main" val="1"/>
+              </p:ext>
+            </p:extLst>
+          </p:nvPr>
+        </p:nvSpPr>
+        <p:spPr>
+          <a:xfrm rot="5400000">
+            <a:off x="4248113" y="1405210"/>
+            <a:ext cx="1463040" cy="9144"/>
+          </a:xfrm>
+          <a:prstGeom prst="rect">
+            <a:avLst/>
+          </a:prstGeom>
+          <a:solidFill>
+            <a:schemeClr val="tx2">
+              <a:lumMod val="25000"/>
+              <a:lumOff val="75000"/>
+            </a:schemeClr>
+          </a:solidFill>
+          <a:ln w="3175">
+            <a:noFill/>
+          </a:ln>
+          <a:effectLst/>
+        </p:spPr>
+        <p:style>
+          <a:lnRef idx="2">
+            <a:schemeClr val="accent1">
+              <a:shade val="50000"/>
+            </a:schemeClr>
+          </a:lnRef>
+          <a:fillRef idx="1">
+            <a:schemeClr val="accent1"/>
+          </a:fillRef>
+          <a:effectRef idx="0">
+            <a:schemeClr val="accent1"/>
+          </a:effectRef>
+          <a:fontRef idx="minor">
+            <a:schemeClr val="lt1"/>
+          </a:fontRef>
+        </p:style>
+        <p:txBody>
+          <a:bodyPr rtlCol="0" anchor="ctr"/>
+          <a:lstStyle/>
+          <a:p>
+            <a:pPr marL="0" marR="0" lvl="0" indent="0" algn="ctr" defTabSz="914400" rtl="0" eaLnBrk="1" fontAlgn="auto" latinLnBrk="0" hangingPunct="1">
+              <a:lnSpc>
+                <a:spcPct val="100000"/>
+              </a:lnSpc>
+              <a:spcBef>
+                <a:spcPts val="0"/>
+              </a:spcBef>
+              <a:spcAft>
+                <a:spcPts val="0"/>
+              </a:spcAft>
+              <a:buClrTx/>
+              <a:buSzTx/>
+              <a:buFontTx/>
+              <a:buNone/>
+              <a:tabLst/>
+              <a:defRPr/>
+            </a:pPr>
+            <a:endParaRPr kumimoji="0" lang="en-US" sz="1800" b="0" i="0" u="none" strike="noStrike" kern="1200" cap="none" spc="0" normalizeH="0" baseline="0" noProof="0">
+              <a:ln>
+                <a:noFill/>
+              </a:ln>
+              <a:solidFill>
+                <a:prstClr val="white"/>
+              </a:solidFill>
+              <a:effectLst/>
+              <a:uLnTx/>
+              <a:uFillTx/>
+              <a:latin typeface="Calibri" panose="020F0502020204030204"/>
+              <a:ea typeface="+mn-ea"/>
+              <a:cs typeface="+mn-cs"/>
+            </a:endParaRPr>
+          </a:p>
+        </p:txBody>
+      </p:sp>
+      <p:sp>
+        <p:nvSpPr>
+          <p:cNvPr id="9" name="Content Placeholder 8">
+            <a:extLst>
+              <a:ext uri="{FF2B5EF4-FFF2-40B4-BE49-F238E27FC236}">
+                <a16:creationId xmlns:a16="http://schemas.microsoft.com/office/drawing/2014/main" id="{904EC0C0-693A-4C56-87D1-125BE8FA542A}"/>
+              </a:ext>
+            </a:extLst>
+          </p:cNvPr>
+          <p:cNvSpPr>
+            <a:spLocks noGrp="1"/>
+          </p:cNvSpPr>
+          <p:nvPr>
+            <p:ph idx="1"/>
+          </p:nvPr>
+        </p:nvSpPr>
+        <p:spPr>
+          <a:xfrm>
+            <a:off x="5351164" y="586822"/>
+            <a:ext cx="6002636" cy="1645920"/>
+          </a:xfrm>
+        </p:spPr>
+        <p:txBody>
+          <a:bodyPr anchor="ctr">
+            <a:normAutofit/>
+          </a:bodyPr>
+          <a:lstStyle/>
+          <a:p>
+            <a:r>
+              <a:rPr lang="en-US" sz="1800" dirty="0"/>
+              <a:t>70 % of homes in early 1800’s to 1900’s were in Manhattan or Brooklyn</a:t>
+            </a:r>
+          </a:p>
+          <a:p>
+            <a:r>
+              <a:rPr lang="en-US" sz="1800" dirty="0"/>
+              <a:t>Recent Homes see an uptick with over 50% of homes in lower priced boroughs </a:t>
+            </a:r>
+          </a:p>
+        </p:txBody>
+      </p:sp>
+      <p:pic>
+        <p:nvPicPr>
+          <p:cNvPr id="1026" name="Picture 2">
+            <a:extLst>
+              <a:ext uri="{FF2B5EF4-FFF2-40B4-BE49-F238E27FC236}">
+                <a16:creationId xmlns:a16="http://schemas.microsoft.com/office/drawing/2014/main" id="{0A63174A-866A-4646-9363-211F9EFB3FDA}"/>
+              </a:ext>
+            </a:extLst>
+          </p:cNvPr>
+          <p:cNvPicPr>
+            <a:picLocks noChangeAspect="1" noChangeArrowheads="1"/>
+          </p:cNvPicPr>
+          <p:nvPr/>
+        </p:nvPicPr>
+        <p:blipFill>
+          <a:blip r:embed="rId2">
+            <a:extLst>
+              <a:ext uri="{28A0092B-C50C-407E-A947-70E740481C1C}">
+                <a14:useLocalDpi xmlns:a14="http://schemas.microsoft.com/office/drawing/2010/main" val="0"/>
+              </a:ext>
+            </a:extLst>
+          </a:blip>
+          <a:srcRect/>
+          <a:stretch>
+            <a:fillRect/>
+          </a:stretch>
+        </p:blipFill>
+        <p:spPr bwMode="auto">
+          <a:xfrm>
+            <a:off x="1380745" y="2555516"/>
+            <a:ext cx="9328038" cy="4201409"/>
+          </a:xfrm>
+          <a:prstGeom prst="rect">
+            <a:avLst/>
+          </a:prstGeom>
+          <a:noFill/>
+          <a:extLst>
+            <a:ext uri="{909E8E84-426E-40DD-AFC4-6F175D3DCCD1}">
+              <a14:hiddenFill xmlns:a14="http://schemas.microsoft.com/office/drawing/2010/main">
+                <a:solidFill>
+                  <a:srgbClr val="FFFFFF"/>
+                </a:solidFill>
+              </a14:hiddenFill>
+            </a:ext>
+          </a:extLst>
+        </p:spPr>
+      </p:pic>
+    </p:spTree>
+    <p:extLst>
+      <p:ext uri="{BB962C8B-B14F-4D97-AF65-F5344CB8AC3E}">
+        <p14:creationId xmlns:p14="http://schemas.microsoft.com/office/powerpoint/2010/main" val="3044482638"/>
+      </p:ext>
+    </p:extLst>
+  </p:cSld>
+  <p:clrMapOvr>
+    <a:masterClrMapping/>
+  </p:clrMapOvr>
+</p:sld>
+</file>
+
+<file path=ppt/slides/slide11.xml><?xml version="1.0" encoding="utf-8"?>
+<p:sld xmlns:a="http://schemas.openxmlformats.org/drawingml/2006/main" xmlns:r="http://schemas.openxmlformats.org/officeDocument/2006/relationships" xmlns:p="http://schemas.openxmlformats.org/presentationml/2006/main">
+  <p:cSld>
+    <p:bg>
+      <p:bgPr>
+        <a:solidFill>
+          <a:schemeClr val="bg1"/>
+        </a:solidFill>
+        <a:effectLst/>
+      </p:bgPr>
+    </p:bg>
+    <p:spTree>
+      <p:nvGrpSpPr>
+        <p:cNvPr id="1" name=""/>
+        <p:cNvGrpSpPr/>
+        <p:nvPr/>
+      </p:nvGrpSpPr>
+      <p:grpSpPr>
+        <a:xfrm>
+          <a:off x="0" y="0"/>
+          <a:ext cx="0" cy="0"/>
+          <a:chOff x="0" y="0"/>
+          <a:chExt cx="0" cy="0"/>
+        </a:xfrm>
+      </p:grpSpPr>
       <p:sp>
         <p:nvSpPr>
           <p:cNvPr id="10" name="Rectangle 9">
@@ -17719,7 +18236,7 @@
 </p:sld>
 </file>
 
-<file path=ppt/slides/slide11.xml><?xml version="1.0" encoding="utf-8"?>
+<file path=ppt/slides/slide12.xml><?xml version="1.0" encoding="utf-8"?>
 <p:sld xmlns:a="http://schemas.openxmlformats.org/drawingml/2006/main" xmlns:r="http://schemas.openxmlformats.org/officeDocument/2006/relationships" xmlns:p="http://schemas.openxmlformats.org/presentationml/2006/main">
   <p:cSld>
     <p:bg>
@@ -18071,7 +18588,7 @@
 </p:sld>
 </file>
 
-<file path=ppt/slides/slide12.xml><?xml version="1.0" encoding="utf-8"?>
+<file path=ppt/slides/slide13.xml><?xml version="1.0" encoding="utf-8"?>
 <p:sld xmlns:a="http://schemas.openxmlformats.org/drawingml/2006/main" xmlns:r="http://schemas.openxmlformats.org/officeDocument/2006/relationships" xmlns:p="http://schemas.openxmlformats.org/presentationml/2006/main">
   <p:cSld>
     <p:bg>
@@ -18423,7 +18940,7 @@
 </p:sld>
 </file>
 
-<file path=ppt/slides/slide13.xml><?xml version="1.0" encoding="utf-8"?>
+<file path=ppt/slides/slide14.xml><?xml version="1.0" encoding="utf-8"?>
 <p:sld xmlns:a="http://schemas.openxmlformats.org/drawingml/2006/main" xmlns:r="http://schemas.openxmlformats.org/officeDocument/2006/relationships" xmlns:p="http://schemas.openxmlformats.org/presentationml/2006/main">
   <p:cSld>
     <p:bg>
@@ -18782,7 +19299,7 @@
 </p:sld>
 </file>
 
-<file path=ppt/slides/slide14.xml><?xml version="1.0" encoding="utf-8"?>
+<file path=ppt/slides/slide15.xml><?xml version="1.0" encoding="utf-8"?>
 <p:sld xmlns:a="http://schemas.openxmlformats.org/drawingml/2006/main" xmlns:r="http://schemas.openxmlformats.org/officeDocument/2006/relationships" xmlns:p="http://schemas.openxmlformats.org/presentationml/2006/main">
   <p:cSld>
     <p:bg>
@@ -19137,7 +19654,13 @@
           <a:p>
             <a:r>
               <a:rPr lang="en-US" sz="2000" b="1" dirty="0"/>
-              <a:t>Multi-family homes and Townhouses have greater return</a:t>
+              <a:t>Multi-family homes and Condominium have greater returns</a:t>
+            </a:r>
+          </a:p>
+          <a:p>
+            <a:r>
+              <a:rPr lang="en-US" sz="2000" b="1" dirty="0"/>
+              <a:t>Townhouses yield a high price but due to lack of data it is inconclusive</a:t>
             </a:r>
           </a:p>
           <a:p>
@@ -20883,9 +21406,383 @@
           <a:chExt cx="0" cy="0"/>
         </a:xfrm>
       </p:grpSpPr>
+      <p:sp useBgFill="1">
+        <p:nvSpPr>
+          <p:cNvPr id="8" name="Rectangle 7">
+            <a:extLst>
+              <a:ext uri="{FF2B5EF4-FFF2-40B4-BE49-F238E27FC236}">
+                <a16:creationId xmlns:a16="http://schemas.microsoft.com/office/drawing/2014/main" id="{CBB2B1F0-0DD6-4744-9A46-7A344FB48E40}"/>
+              </a:ext>
+              <a:ext uri="{C183D7F6-B498-43B3-948B-1728B52AA6E4}">
+                <adec:decorative xmlns:adec="http://schemas.microsoft.com/office/drawing/2017/decorative" val="1"/>
+              </a:ext>
+            </a:extLst>
+          </p:cNvPr>
+          <p:cNvSpPr>
+            <a:spLocks noGrp="1" noRot="1" noChangeAspect="1" noMove="1" noResize="1" noEditPoints="1" noAdjustHandles="1" noChangeArrowheads="1" noChangeShapeType="1" noTextEdit="1"/>
+          </p:cNvSpPr>
+          <p:nvPr>
+            <p:extLst>
+              <p:ext uri="{386F3935-93C4-4BCD-93E2-E3B085C9AB24}">
+                <p16:designElem xmlns:p16="http://schemas.microsoft.com/office/powerpoint/2015/main" val="1"/>
+              </p:ext>
+            </p:extLst>
+          </p:nvPr>
+        </p:nvSpPr>
+        <p:spPr>
+          <a:xfrm>
+            <a:off x="0" y="0"/>
+            <a:ext cx="12192000" cy="6858000"/>
+          </a:xfrm>
+          <a:prstGeom prst="rect">
+            <a:avLst/>
+          </a:prstGeom>
+          <a:ln>
+            <a:noFill/>
+          </a:ln>
+        </p:spPr>
+        <p:style>
+          <a:lnRef idx="2">
+            <a:schemeClr val="accent1">
+              <a:shade val="50000"/>
+            </a:schemeClr>
+          </a:lnRef>
+          <a:fillRef idx="1">
+            <a:schemeClr val="accent1"/>
+          </a:fillRef>
+          <a:effectRef idx="0">
+            <a:schemeClr val="accent1"/>
+          </a:effectRef>
+          <a:fontRef idx="minor">
+            <a:schemeClr val="lt1"/>
+          </a:fontRef>
+        </p:style>
+        <p:txBody>
+          <a:bodyPr rtlCol="0" anchor="ctr"/>
+          <a:lstStyle/>
+          <a:p>
+            <a:pPr algn="ctr"/>
+            <a:endParaRPr lang="en-US"/>
+          </a:p>
+        </p:txBody>
+      </p:sp>
+      <p:sp>
+        <p:nvSpPr>
+          <p:cNvPr id="2" name="Title 1">
+            <a:extLst>
+              <a:ext uri="{FF2B5EF4-FFF2-40B4-BE49-F238E27FC236}">
+                <a16:creationId xmlns:a16="http://schemas.microsoft.com/office/drawing/2014/main" id="{F29138A0-974C-43BE-8E5F-11053C50802B}"/>
+              </a:ext>
+            </a:extLst>
+          </p:cNvPr>
+          <p:cNvSpPr>
+            <a:spLocks noGrp="1"/>
+          </p:cNvSpPr>
+          <p:nvPr>
+            <p:ph type="title"/>
+          </p:nvPr>
+        </p:nvSpPr>
+        <p:spPr>
+          <a:xfrm>
+            <a:off x="841248" y="426720"/>
+            <a:ext cx="10506456" cy="1919141"/>
+          </a:xfrm>
+        </p:spPr>
+        <p:txBody>
+          <a:bodyPr anchor="b">
+            <a:normAutofit/>
+          </a:bodyPr>
+          <a:lstStyle/>
+          <a:p>
+            <a:r>
+              <a:rPr lang="en-US" sz="6000"/>
+              <a:t>Imputations - MICE</a:t>
+            </a:r>
+          </a:p>
+        </p:txBody>
+      </p:sp>
       <p:sp>
         <p:nvSpPr>
           <p:cNvPr id="10" name="Rectangle 9">
+            <a:extLst>
+              <a:ext uri="{FF2B5EF4-FFF2-40B4-BE49-F238E27FC236}">
+                <a16:creationId xmlns:a16="http://schemas.microsoft.com/office/drawing/2014/main" id="{7A0B5DEA-ADF6-4BA5-9307-147F0A4685A0}"/>
+              </a:ext>
+              <a:ext uri="{C183D7F6-B498-43B3-948B-1728B52AA6E4}">
+                <adec:decorative xmlns:adec="http://schemas.microsoft.com/office/drawing/2017/decorative" val="1"/>
+              </a:ext>
+            </a:extLst>
+          </p:cNvPr>
+          <p:cNvSpPr>
+            <a:spLocks noGrp="1" noRot="1" noChangeAspect="1" noMove="1" noResize="1" noEditPoints="1" noAdjustHandles="1" noChangeArrowheads="1" noChangeShapeType="1" noTextEdit="1"/>
+          </p:cNvSpPr>
+          <p:nvPr>
+            <p:extLst>
+              <p:ext uri="{386F3935-93C4-4BCD-93E2-E3B085C9AB24}">
+                <p16:designElem xmlns:p16="http://schemas.microsoft.com/office/powerpoint/2015/main" val="1"/>
+              </p:ext>
+            </p:extLst>
+          </p:nvPr>
+        </p:nvSpPr>
+        <p:spPr>
+          <a:xfrm>
+            <a:off x="868680" y="2898648"/>
+            <a:ext cx="10506456" cy="18288"/>
+          </a:xfrm>
+          <a:prstGeom prst="rect">
+            <a:avLst/>
+          </a:prstGeom>
+          <a:solidFill>
+            <a:schemeClr val="tx2">
+              <a:lumMod val="25000"/>
+              <a:lumOff val="75000"/>
+            </a:schemeClr>
+          </a:solidFill>
+          <a:ln w="3175">
+            <a:noFill/>
+          </a:ln>
+          <a:effectLst/>
+        </p:spPr>
+        <p:style>
+          <a:lnRef idx="2">
+            <a:schemeClr val="accent1">
+              <a:shade val="50000"/>
+            </a:schemeClr>
+          </a:lnRef>
+          <a:fillRef idx="1">
+            <a:schemeClr val="accent1"/>
+          </a:fillRef>
+          <a:effectRef idx="0">
+            <a:schemeClr val="accent1"/>
+          </a:effectRef>
+          <a:fontRef idx="minor">
+            <a:schemeClr val="lt1"/>
+          </a:fontRef>
+        </p:style>
+        <p:txBody>
+          <a:bodyPr rtlCol="0" anchor="ctr"/>
+          <a:lstStyle/>
+          <a:p>
+            <a:pPr marL="0" marR="0" lvl="0" indent="0" algn="ctr" defTabSz="914400" rtl="0" eaLnBrk="1" fontAlgn="auto" latinLnBrk="0" hangingPunct="1">
+              <a:lnSpc>
+                <a:spcPct val="100000"/>
+              </a:lnSpc>
+              <a:spcBef>
+                <a:spcPts val="0"/>
+              </a:spcBef>
+              <a:spcAft>
+                <a:spcPts val="0"/>
+              </a:spcAft>
+              <a:buClrTx/>
+              <a:buSzTx/>
+              <a:buFontTx/>
+              <a:buNone/>
+              <a:tabLst/>
+              <a:defRPr/>
+            </a:pPr>
+            <a:endParaRPr kumimoji="0" lang="en-US" sz="1800" b="0" i="0" u="none" strike="noStrike" kern="1200" cap="none" spc="0" normalizeH="0" baseline="0" noProof="0">
+              <a:ln>
+                <a:noFill/>
+              </a:ln>
+              <a:solidFill>
+                <a:prstClr val="white"/>
+              </a:solidFill>
+              <a:effectLst/>
+              <a:uLnTx/>
+              <a:uFillTx/>
+              <a:latin typeface="Calibri" panose="020F0502020204030204"/>
+              <a:ea typeface="+mn-ea"/>
+              <a:cs typeface="+mn-cs"/>
+            </a:endParaRPr>
+          </a:p>
+        </p:txBody>
+      </p:sp>
+      <p:sp>
+        <p:nvSpPr>
+          <p:cNvPr id="12" name="Rectangle 11">
+            <a:extLst>
+              <a:ext uri="{FF2B5EF4-FFF2-40B4-BE49-F238E27FC236}">
+                <a16:creationId xmlns:a16="http://schemas.microsoft.com/office/drawing/2014/main" id="{9DECDBF4-02B6-4BB4-B65B-B8107AD6A9E8}"/>
+              </a:ext>
+              <a:ext uri="{C183D7F6-B498-43B3-948B-1728B52AA6E4}">
+                <adec:decorative xmlns:adec="http://schemas.microsoft.com/office/drawing/2017/decorative" val="1"/>
+              </a:ext>
+            </a:extLst>
+          </p:cNvPr>
+          <p:cNvSpPr>
+            <a:spLocks noGrp="1" noRot="1" noChangeAspect="1" noMove="1" noResize="1" noEditPoints="1" noAdjustHandles="1" noChangeArrowheads="1" noChangeShapeType="1" noTextEdit="1"/>
+          </p:cNvSpPr>
+          <p:nvPr>
+            <p:extLst>
+              <p:ext uri="{386F3935-93C4-4BCD-93E2-E3B085C9AB24}">
+                <p16:designElem xmlns:p16="http://schemas.microsoft.com/office/powerpoint/2015/main" val="1"/>
+              </p:ext>
+            </p:extLst>
+          </p:nvPr>
+        </p:nvSpPr>
+        <p:spPr>
+          <a:xfrm flipV="1">
+            <a:off x="841248" y="2783982"/>
+            <a:ext cx="1873457" cy="137160"/>
+          </a:xfrm>
+          <a:prstGeom prst="rect">
+            <a:avLst/>
+          </a:prstGeom>
+          <a:solidFill>
+            <a:schemeClr val="accent1"/>
+          </a:solidFill>
+          <a:ln>
+            <a:noFill/>
+          </a:ln>
+        </p:spPr>
+        <p:style>
+          <a:lnRef idx="2">
+            <a:schemeClr val="accent1">
+              <a:shade val="50000"/>
+            </a:schemeClr>
+          </a:lnRef>
+          <a:fillRef idx="1">
+            <a:schemeClr val="accent1"/>
+          </a:fillRef>
+          <a:effectRef idx="0">
+            <a:schemeClr val="accent1"/>
+          </a:effectRef>
+          <a:fontRef idx="minor">
+            <a:schemeClr val="lt1"/>
+          </a:fontRef>
+        </p:style>
+        <p:txBody>
+          <a:bodyPr rtlCol="0" anchor="ctr"/>
+          <a:lstStyle/>
+          <a:p>
+            <a:pPr marL="0" marR="0" lvl="0" indent="0" algn="ctr" defTabSz="914400" rtl="0" eaLnBrk="1" fontAlgn="auto" latinLnBrk="0" hangingPunct="1">
+              <a:lnSpc>
+                <a:spcPct val="100000"/>
+              </a:lnSpc>
+              <a:spcBef>
+                <a:spcPts val="0"/>
+              </a:spcBef>
+              <a:spcAft>
+                <a:spcPts val="0"/>
+              </a:spcAft>
+              <a:buClrTx/>
+              <a:buSzTx/>
+              <a:buFontTx/>
+              <a:buNone/>
+              <a:tabLst/>
+              <a:defRPr/>
+            </a:pPr>
+            <a:endParaRPr kumimoji="0" lang="en-US" sz="1800" b="0" i="0" u="none" strike="noStrike" kern="1200" cap="none" spc="0" normalizeH="0" baseline="0" noProof="0">
+              <a:ln>
+                <a:noFill/>
+              </a:ln>
+              <a:solidFill>
+                <a:prstClr val="white"/>
+              </a:solidFill>
+              <a:effectLst/>
+              <a:uLnTx/>
+              <a:uFillTx/>
+              <a:latin typeface="Calibri" panose="020F0502020204030204"/>
+              <a:ea typeface="+mn-ea"/>
+              <a:cs typeface="+mn-cs"/>
+            </a:endParaRPr>
+          </a:p>
+        </p:txBody>
+      </p:sp>
+      <p:sp>
+        <p:nvSpPr>
+          <p:cNvPr id="7" name="Content Placeholder 2">
+            <a:extLst>
+              <a:ext uri="{FF2B5EF4-FFF2-40B4-BE49-F238E27FC236}">
+                <a16:creationId xmlns:a16="http://schemas.microsoft.com/office/drawing/2014/main" id="{0F1F686C-23F1-46AE-A1C0-FF9465A1C07C}"/>
+              </a:ext>
+            </a:extLst>
+          </p:cNvPr>
+          <p:cNvSpPr>
+            <a:spLocks noGrp="1"/>
+          </p:cNvSpPr>
+          <p:nvPr>
+            <p:ph idx="1"/>
+          </p:nvPr>
+        </p:nvSpPr>
+        <p:spPr>
+          <a:xfrm>
+            <a:off x="841248" y="3337269"/>
+            <a:ext cx="10509504" cy="2905686"/>
+          </a:xfrm>
+        </p:spPr>
+        <p:txBody>
+          <a:bodyPr>
+            <a:normAutofit/>
+          </a:bodyPr>
+          <a:lstStyle/>
+          <a:p>
+            <a:r>
+              <a:rPr lang="en-US" sz="2000" dirty="0"/>
+              <a:t>Imputation method utilizing Gradient Regression on missing values</a:t>
+            </a:r>
+          </a:p>
+          <a:p>
+            <a:r>
+              <a:rPr lang="en-US" sz="2000" dirty="0"/>
+              <a:t>Estimates missing value of one feature by learning from other features and looking at past values given data from other features. </a:t>
+            </a:r>
+          </a:p>
+          <a:p>
+            <a:r>
+              <a:rPr lang="en-US" sz="2000" dirty="0"/>
+              <a:t>6 Step process </a:t>
+            </a:r>
+          </a:p>
+          <a:p>
+            <a:r>
+              <a:rPr lang="en-US" sz="2000" dirty="0"/>
+              <a:t>Greater results than mean or median imputation.</a:t>
+            </a:r>
+          </a:p>
+        </p:txBody>
+      </p:sp>
+    </p:spTree>
+    <p:extLst>
+      <p:ext uri="{BB962C8B-B14F-4D97-AF65-F5344CB8AC3E}">
+        <p14:creationId xmlns:p14="http://schemas.microsoft.com/office/powerpoint/2010/main" val="2738013599"/>
+      </p:ext>
+    </p:extLst>
+  </p:cSld>
+  <p:clrMapOvr>
+    <a:masterClrMapping/>
+  </p:clrMapOvr>
+</p:sld>
+</file>
+
+<file path=ppt/slides/slide7.xml><?xml version="1.0" encoding="utf-8"?>
+<p:sld xmlns:a="http://schemas.openxmlformats.org/drawingml/2006/main" xmlns:r="http://schemas.openxmlformats.org/officeDocument/2006/relationships" xmlns:p="http://schemas.openxmlformats.org/presentationml/2006/main">
+  <p:cSld>
+    <p:bg>
+      <p:bgPr>
+        <a:solidFill>
+          <a:schemeClr val="bg1"/>
+        </a:solidFill>
+        <a:effectLst/>
+      </p:bgPr>
+    </p:bg>
+    <p:spTree>
+      <p:nvGrpSpPr>
+        <p:cNvPr id="1" name=""/>
+        <p:cNvGrpSpPr/>
+        <p:nvPr/>
+      </p:nvGrpSpPr>
+      <p:grpSpPr>
+        <a:xfrm>
+          <a:off x="0" y="0"/>
+          <a:ext cx="0" cy="0"/>
+          <a:chOff x="0" y="0"/>
+          <a:chExt cx="0" cy="0"/>
+        </a:xfrm>
+      </p:grpSpPr>
+      <p:sp>
+        <p:nvSpPr>
+          <p:cNvPr id="71" name="Rectangle 70">
             <a:extLst>
               <a:ext uri="{FF2B5EF4-FFF2-40B4-BE49-F238E27FC236}">
                 <a16:creationId xmlns:a16="http://schemas.microsoft.com/office/drawing/2014/main" id="{8D06CE56-3881-4ADA-8CEF-D18B02C242A3}"/>
@@ -20977,7 +21874,7 @@
       </p:sp>
       <p:sp>
         <p:nvSpPr>
-          <p:cNvPr id="12" name="Rectangle 11">
+          <p:cNvPr id="73" name="Rectangle 72">
             <a:extLst>
               <a:ext uri="{FF2B5EF4-FFF2-40B4-BE49-F238E27FC236}">
                 <a16:creationId xmlns:a16="http://schemas.microsoft.com/office/drawing/2014/main" id="{79F3C543-62EC-4433-9C93-A2CD8764E9B4}"/>
@@ -21073,7 +21970,603 @@
       </p:sp>
       <p:sp useBgFill="1">
         <p:nvSpPr>
-          <p:cNvPr id="14" name="Rectangle 13">
+          <p:cNvPr id="75" name="Rectangle 74">
+            <a:extLst>
+              <a:ext uri="{FF2B5EF4-FFF2-40B4-BE49-F238E27FC236}">
+                <a16:creationId xmlns:a16="http://schemas.microsoft.com/office/drawing/2014/main" id="{68AF5748-FED8-45BA-8631-26D1D10F3246}"/>
+              </a:ext>
+              <a:ext uri="{C183D7F6-B498-43B3-948B-1728B52AA6E4}">
+                <adec:decorative xmlns:adec="http://schemas.microsoft.com/office/drawing/2017/decorative" val="1"/>
+              </a:ext>
+            </a:extLst>
+          </p:cNvPr>
+          <p:cNvSpPr>
+            <a:spLocks noGrp="1" noRot="1" noChangeAspect="1" noMove="1" noResize="1" noEditPoints="1" noAdjustHandles="1" noChangeArrowheads="1" noChangeShapeType="1" noTextEdit="1"/>
+          </p:cNvSpPr>
+          <p:nvPr>
+            <p:extLst>
+              <p:ext uri="{386F3935-93C4-4BCD-93E2-E3B085C9AB24}">
+                <p16:designElem xmlns:p16="http://schemas.microsoft.com/office/powerpoint/2015/main" val="1"/>
+              </p:ext>
+            </p:extLst>
+          </p:nvPr>
+        </p:nvSpPr>
+        <p:spPr>
+          <a:xfrm>
+            <a:off x="0" y="0"/>
+            <a:ext cx="12192000" cy="6858000"/>
+          </a:xfrm>
+          <a:prstGeom prst="rect">
+            <a:avLst/>
+          </a:prstGeom>
+          <a:ln>
+            <a:noFill/>
+          </a:ln>
+        </p:spPr>
+        <p:style>
+          <a:lnRef idx="2">
+            <a:schemeClr val="accent1">
+              <a:shade val="50000"/>
+            </a:schemeClr>
+          </a:lnRef>
+          <a:fillRef idx="1">
+            <a:schemeClr val="accent1"/>
+          </a:fillRef>
+          <a:effectRef idx="0">
+            <a:schemeClr val="accent1"/>
+          </a:effectRef>
+          <a:fontRef idx="minor">
+            <a:schemeClr val="lt1"/>
+          </a:fontRef>
+        </p:style>
+        <p:txBody>
+          <a:bodyPr rtlCol="0" anchor="ctr"/>
+          <a:lstStyle/>
+          <a:p>
+            <a:pPr algn="ctr"/>
+            <a:endParaRPr lang="en-US"/>
+          </a:p>
+        </p:txBody>
+      </p:sp>
+      <p:sp>
+        <p:nvSpPr>
+          <p:cNvPr id="2" name="Title 1">
+            <a:extLst>
+              <a:ext uri="{FF2B5EF4-FFF2-40B4-BE49-F238E27FC236}">
+                <a16:creationId xmlns:a16="http://schemas.microsoft.com/office/drawing/2014/main" id="{0C0472DA-1B9C-45C5-B0AD-D5C8C7C209D0}"/>
+              </a:ext>
+            </a:extLst>
+          </p:cNvPr>
+          <p:cNvSpPr>
+            <a:spLocks noGrp="1"/>
+          </p:cNvSpPr>
+          <p:nvPr>
+            <p:ph type="title"/>
+          </p:nvPr>
+        </p:nvSpPr>
+        <p:spPr>
+          <a:xfrm>
+            <a:off x="477981" y="1122363"/>
+            <a:ext cx="4023360" cy="3204134"/>
+          </a:xfrm>
+        </p:spPr>
+        <p:txBody>
+          <a:bodyPr vert="horz" lIns="91440" tIns="45720" rIns="91440" bIns="45720" rtlCol="0" anchor="b">
+            <a:normAutofit/>
+          </a:bodyPr>
+          <a:lstStyle/>
+          <a:p>
+            <a:r>
+              <a:rPr lang="en-US" sz="4800" dirty="0"/>
+              <a:t>Location Impact</a:t>
+            </a:r>
+          </a:p>
+        </p:txBody>
+      </p:sp>
+      <p:sp>
+        <p:nvSpPr>
+          <p:cNvPr id="77" name="Rectangle 76">
+            <a:extLst>
+              <a:ext uri="{FF2B5EF4-FFF2-40B4-BE49-F238E27FC236}">
+                <a16:creationId xmlns:a16="http://schemas.microsoft.com/office/drawing/2014/main" id="{AF2F604E-43BE-4DC3-B983-E071523364F8}"/>
+              </a:ext>
+              <a:ext uri="{C183D7F6-B498-43B3-948B-1728B52AA6E4}">
+                <adec:decorative xmlns:adec="http://schemas.microsoft.com/office/drawing/2017/decorative" val="1"/>
+              </a:ext>
+            </a:extLst>
+          </p:cNvPr>
+          <p:cNvSpPr>
+            <a:spLocks noGrp="1" noRot="1" noChangeAspect="1" noMove="1" noResize="1" noEditPoints="1" noAdjustHandles="1" noChangeArrowheads="1" noChangeShapeType="1" noTextEdit="1"/>
+          </p:cNvSpPr>
+          <p:nvPr>
+            <p:extLst>
+              <p:ext uri="{386F3935-93C4-4BCD-93E2-E3B085C9AB24}">
+                <p16:designElem xmlns:p16="http://schemas.microsoft.com/office/powerpoint/2015/main" val="1"/>
+              </p:ext>
+            </p:extLst>
+          </p:nvPr>
+        </p:nvSpPr>
+        <p:spPr>
+          <a:xfrm rot="5400000">
+            <a:off x="759921" y="346791"/>
+            <a:ext cx="146304" cy="704088"/>
+          </a:xfrm>
+          <a:prstGeom prst="rect">
+            <a:avLst/>
+          </a:prstGeom>
+          <a:solidFill>
+            <a:schemeClr val="accent1"/>
+          </a:solidFill>
+          <a:ln>
+            <a:noFill/>
+          </a:ln>
+        </p:spPr>
+        <p:style>
+          <a:lnRef idx="2">
+            <a:schemeClr val="accent1">
+              <a:shade val="50000"/>
+            </a:schemeClr>
+          </a:lnRef>
+          <a:fillRef idx="1">
+            <a:schemeClr val="accent1"/>
+          </a:fillRef>
+          <a:effectRef idx="0">
+            <a:schemeClr val="accent1"/>
+          </a:effectRef>
+          <a:fontRef idx="minor">
+            <a:schemeClr val="lt1"/>
+          </a:fontRef>
+        </p:style>
+        <p:txBody>
+          <a:bodyPr rtlCol="0" anchor="ctr"/>
+          <a:lstStyle/>
+          <a:p>
+            <a:pPr marL="0" marR="0" lvl="0" indent="0" algn="ctr" defTabSz="914400" rtl="0" eaLnBrk="1" fontAlgn="auto" latinLnBrk="0" hangingPunct="1">
+              <a:lnSpc>
+                <a:spcPct val="100000"/>
+              </a:lnSpc>
+              <a:spcBef>
+                <a:spcPts val="0"/>
+              </a:spcBef>
+              <a:spcAft>
+                <a:spcPts val="0"/>
+              </a:spcAft>
+              <a:buClrTx/>
+              <a:buSzTx/>
+              <a:buFontTx/>
+              <a:buNone/>
+              <a:tabLst/>
+              <a:defRPr/>
+            </a:pPr>
+            <a:endParaRPr kumimoji="0" lang="en-US" sz="1800" b="0" i="0" u="none" strike="noStrike" kern="1200" cap="none" spc="0" normalizeH="0" baseline="0" noProof="0">
+              <a:ln>
+                <a:noFill/>
+              </a:ln>
+              <a:solidFill>
+                <a:prstClr val="white"/>
+              </a:solidFill>
+              <a:effectLst/>
+              <a:uLnTx/>
+              <a:uFillTx/>
+              <a:latin typeface="Calibri" panose="020F0502020204030204"/>
+              <a:ea typeface="+mn-ea"/>
+              <a:cs typeface="+mn-cs"/>
+            </a:endParaRPr>
+          </a:p>
+        </p:txBody>
+      </p:sp>
+      <p:sp>
+        <p:nvSpPr>
+          <p:cNvPr id="79" name="Rectangle 78">
+            <a:extLst>
+              <a:ext uri="{FF2B5EF4-FFF2-40B4-BE49-F238E27FC236}">
+                <a16:creationId xmlns:a16="http://schemas.microsoft.com/office/drawing/2014/main" id="{08C9B587-E65E-4B52-B37C-ABEBB6E87928}"/>
+              </a:ext>
+              <a:ext uri="{C183D7F6-B498-43B3-948B-1728B52AA6E4}">
+                <adec:decorative xmlns:adec="http://schemas.microsoft.com/office/drawing/2017/decorative" val="1"/>
+              </a:ext>
+            </a:extLst>
+          </p:cNvPr>
+          <p:cNvSpPr>
+            <a:spLocks noGrp="1" noRot="1" noChangeAspect="1" noMove="1" noResize="1" noEditPoints="1" noAdjustHandles="1" noChangeArrowheads="1" noChangeShapeType="1" noTextEdit="1"/>
+          </p:cNvSpPr>
+          <p:nvPr>
+            <p:extLst>
+              <p:ext uri="{386F3935-93C4-4BCD-93E2-E3B085C9AB24}">
+                <p16:designElem xmlns:p16="http://schemas.microsoft.com/office/powerpoint/2015/main" val="1"/>
+              </p:ext>
+            </p:extLst>
+          </p:nvPr>
+        </p:nvSpPr>
+        <p:spPr>
+          <a:xfrm>
+            <a:off x="481029" y="4546920"/>
+            <a:ext cx="4023360" cy="18288"/>
+          </a:xfrm>
+          <a:prstGeom prst="rect">
+            <a:avLst/>
+          </a:prstGeom>
+          <a:solidFill>
+            <a:schemeClr val="tx2">
+              <a:lumMod val="25000"/>
+              <a:lumOff val="75000"/>
+            </a:schemeClr>
+          </a:solidFill>
+          <a:ln w="3175">
+            <a:noFill/>
+          </a:ln>
+          <a:effectLst/>
+        </p:spPr>
+        <p:style>
+          <a:lnRef idx="2">
+            <a:schemeClr val="accent1">
+              <a:shade val="50000"/>
+            </a:schemeClr>
+          </a:lnRef>
+          <a:fillRef idx="1">
+            <a:schemeClr val="accent1"/>
+          </a:fillRef>
+          <a:effectRef idx="0">
+            <a:schemeClr val="accent1"/>
+          </a:effectRef>
+          <a:fontRef idx="minor">
+            <a:schemeClr val="lt1"/>
+          </a:fontRef>
+        </p:style>
+        <p:txBody>
+          <a:bodyPr rtlCol="0" anchor="ctr"/>
+          <a:lstStyle/>
+          <a:p>
+            <a:pPr marL="0" marR="0" lvl="0" indent="0" algn="ctr" defTabSz="914400" rtl="0" eaLnBrk="1" fontAlgn="auto" latinLnBrk="0" hangingPunct="1">
+              <a:lnSpc>
+                <a:spcPct val="100000"/>
+              </a:lnSpc>
+              <a:spcBef>
+                <a:spcPts val="0"/>
+              </a:spcBef>
+              <a:spcAft>
+                <a:spcPts val="0"/>
+              </a:spcAft>
+              <a:buClrTx/>
+              <a:buSzTx/>
+              <a:buFontTx/>
+              <a:buNone/>
+              <a:tabLst/>
+              <a:defRPr/>
+            </a:pPr>
+            <a:endParaRPr kumimoji="0" lang="en-US" sz="1800" b="0" i="0" u="none" strike="noStrike" kern="1200" cap="none" spc="0" normalizeH="0" baseline="0" noProof="0">
+              <a:ln>
+                <a:noFill/>
+              </a:ln>
+              <a:solidFill>
+                <a:prstClr val="white"/>
+              </a:solidFill>
+              <a:effectLst/>
+              <a:uLnTx/>
+              <a:uFillTx/>
+              <a:latin typeface="Calibri" panose="020F0502020204030204"/>
+              <a:ea typeface="+mn-ea"/>
+              <a:cs typeface="+mn-cs"/>
+            </a:endParaRPr>
+          </a:p>
+        </p:txBody>
+      </p:sp>
+      <p:pic>
+        <p:nvPicPr>
+          <p:cNvPr id="2050" name="Picture 2">
+            <a:extLst>
+              <a:ext uri="{FF2B5EF4-FFF2-40B4-BE49-F238E27FC236}">
+                <a16:creationId xmlns:a16="http://schemas.microsoft.com/office/drawing/2014/main" id="{0874DF3A-9D8F-4567-803E-7C279B0AA5D7}"/>
+              </a:ext>
+            </a:extLst>
+          </p:cNvPr>
+          <p:cNvPicPr>
+            <a:picLocks noGrp="1" noChangeAspect="1" noChangeArrowheads="1"/>
+          </p:cNvPicPr>
+          <p:nvPr>
+            <p:ph idx="1"/>
+          </p:nvPr>
+        </p:nvPicPr>
+        <p:blipFill>
+          <a:blip r:embed="rId2">
+            <a:extLst>
+              <a:ext uri="{28A0092B-C50C-407E-A947-70E740481C1C}">
+                <a14:useLocalDpi xmlns:a14="http://schemas.microsoft.com/office/drawing/2010/main" val="0"/>
+              </a:ext>
+            </a:extLst>
+          </a:blip>
+          <a:stretch>
+            <a:fillRect/>
+          </a:stretch>
+        </p:blipFill>
+        <p:spPr bwMode="auto">
+          <a:xfrm>
+            <a:off x="4864608" y="768871"/>
+            <a:ext cx="6846363" cy="5169003"/>
+          </a:xfrm>
+          <a:prstGeom prst="rect">
+            <a:avLst/>
+          </a:prstGeom>
+          <a:noFill/>
+          <a:extLst>
+            <a:ext uri="{909E8E84-426E-40DD-AFC4-6F175D3DCCD1}">
+              <a14:hiddenFill xmlns:a14="http://schemas.microsoft.com/office/drawing/2010/main">
+                <a:solidFill>
+                  <a:srgbClr val="FFFFFF"/>
+                </a:solidFill>
+              </a14:hiddenFill>
+            </a:ext>
+          </a:extLst>
+        </p:spPr>
+      </p:pic>
+      <p:sp>
+        <p:nvSpPr>
+          <p:cNvPr id="6" name="TextBox 5">
+            <a:extLst>
+              <a:ext uri="{FF2B5EF4-FFF2-40B4-BE49-F238E27FC236}">
+                <a16:creationId xmlns:a16="http://schemas.microsoft.com/office/drawing/2014/main" id="{82932455-6E36-4FD2-B826-43B3188B16B0}"/>
+              </a:ext>
+            </a:extLst>
+          </p:cNvPr>
+          <p:cNvSpPr txBox="1"/>
+          <p:nvPr/>
+        </p:nvSpPr>
+        <p:spPr>
+          <a:xfrm>
+            <a:off x="578652" y="4849421"/>
+            <a:ext cx="2917065" cy="923330"/>
+          </a:xfrm>
+          <a:prstGeom prst="rect">
+            <a:avLst/>
+          </a:prstGeom>
+          <a:noFill/>
+        </p:spPr>
+        <p:txBody>
+          <a:bodyPr wrap="square" rtlCol="0">
+            <a:spAutoFit/>
+          </a:bodyPr>
+          <a:lstStyle/>
+          <a:p>
+            <a:pPr marL="285750" indent="-285750">
+              <a:buFont typeface="Arial" panose="020B0604020202020204" pitchFamily="34" charset="0"/>
+              <a:buChar char="•"/>
+            </a:pPr>
+            <a:r>
+              <a:rPr lang="en-US" dirty="0"/>
+              <a:t>Manhattan has the highest average prices for homes</a:t>
+            </a:r>
+          </a:p>
+        </p:txBody>
+      </p:sp>
+    </p:spTree>
+    <p:extLst>
+      <p:ext uri="{BB962C8B-B14F-4D97-AF65-F5344CB8AC3E}">
+        <p14:creationId xmlns:p14="http://schemas.microsoft.com/office/powerpoint/2010/main" val="352554439"/>
+      </p:ext>
+    </p:extLst>
+  </p:cSld>
+  <p:clrMapOvr>
+    <a:masterClrMapping/>
+  </p:clrMapOvr>
+</p:sld>
+</file>
+
+<file path=ppt/slides/slide8.xml><?xml version="1.0" encoding="utf-8"?>
+<p:sld xmlns:a="http://schemas.openxmlformats.org/drawingml/2006/main" xmlns:r="http://schemas.openxmlformats.org/officeDocument/2006/relationships" xmlns:p="http://schemas.openxmlformats.org/presentationml/2006/main">
+  <p:cSld>
+    <p:bg>
+      <p:bgPr>
+        <a:solidFill>
+          <a:schemeClr val="bg1"/>
+        </a:solidFill>
+        <a:effectLst/>
+      </p:bgPr>
+    </p:bg>
+    <p:spTree>
+      <p:nvGrpSpPr>
+        <p:cNvPr id="1" name=""/>
+        <p:cNvGrpSpPr/>
+        <p:nvPr/>
+      </p:nvGrpSpPr>
+      <p:grpSpPr>
+        <a:xfrm>
+          <a:off x="0" y="0"/>
+          <a:ext cx="0" cy="0"/>
+          <a:chOff x="0" y="0"/>
+          <a:chExt cx="0" cy="0"/>
+        </a:xfrm>
+      </p:grpSpPr>
+      <p:sp>
+        <p:nvSpPr>
+          <p:cNvPr id="137" name="Rectangle 136">
+            <a:extLst>
+              <a:ext uri="{FF2B5EF4-FFF2-40B4-BE49-F238E27FC236}">
+                <a16:creationId xmlns:a16="http://schemas.microsoft.com/office/drawing/2014/main" id="{8D06CE56-3881-4ADA-8CEF-D18B02C242A3}"/>
+              </a:ext>
+              <a:ext uri="{C183D7F6-B498-43B3-948B-1728B52AA6E4}">
+                <adec:decorative xmlns:adec="http://schemas.microsoft.com/office/drawing/2017/decorative" val="1"/>
+              </a:ext>
+            </a:extLst>
+          </p:cNvPr>
+          <p:cNvSpPr>
+            <a:spLocks noGrp="1" noRot="1" noChangeAspect="1" noMove="1" noResize="1" noEditPoints="1" noAdjustHandles="1" noChangeArrowheads="1" noChangeShapeType="1" noTextEdit="1"/>
+          </p:cNvSpPr>
+          <p:nvPr>
+            <p:extLst>
+              <p:ext uri="{386F3935-93C4-4BCD-93E2-E3B085C9AB24}">
+                <p16:designElem xmlns:p16="http://schemas.microsoft.com/office/powerpoint/2015/main" val="1"/>
+              </p:ext>
+            </p:extLst>
+          </p:nvPr>
+        </p:nvSpPr>
+        <p:spPr>
+          <a:xfrm rot="5400000">
+            <a:off x="857544" y="346791"/>
+            <a:ext cx="146304" cy="704088"/>
+          </a:xfrm>
+          <a:prstGeom prst="rect">
+            <a:avLst/>
+          </a:prstGeom>
+          <a:solidFill>
+            <a:schemeClr val="accent1"/>
+          </a:solidFill>
+          <a:ln>
+            <a:noFill/>
+          </a:ln>
+        </p:spPr>
+        <p:style>
+          <a:lnRef idx="2">
+            <a:schemeClr val="accent1">
+              <a:shade val="50000"/>
+            </a:schemeClr>
+          </a:lnRef>
+          <a:fillRef idx="1">
+            <a:schemeClr val="accent1"/>
+          </a:fillRef>
+          <a:effectRef idx="0">
+            <a:schemeClr val="accent1"/>
+          </a:effectRef>
+          <a:fontRef idx="minor">
+            <a:schemeClr val="lt1"/>
+          </a:fontRef>
+        </p:style>
+        <p:txBody>
+          <a:bodyPr rtlCol="0" anchor="ctr"/>
+          <a:lstStyle/>
+          <a:p>
+            <a:pPr marL="0" marR="0" lvl="0" indent="0" algn="ctr" defTabSz="914400" rtl="0" eaLnBrk="1" fontAlgn="auto" latinLnBrk="0" hangingPunct="1">
+              <a:lnSpc>
+                <a:spcPct val="100000"/>
+              </a:lnSpc>
+              <a:spcBef>
+                <a:spcPts val="0"/>
+              </a:spcBef>
+              <a:spcAft>
+                <a:spcPts val="0"/>
+              </a:spcAft>
+              <a:buClrTx/>
+              <a:buSzTx/>
+              <a:buFontTx/>
+              <a:buNone/>
+              <a:tabLst/>
+              <a:defRPr/>
+            </a:pPr>
+            <a:endParaRPr kumimoji="0" lang="en-US" sz="1800" b="0" i="0" u="none" strike="noStrike" kern="1200" cap="none" spc="0" normalizeH="0" baseline="0" noProof="0">
+              <a:ln>
+                <a:noFill/>
+              </a:ln>
+              <a:solidFill>
+                <a:prstClr val="white"/>
+              </a:solidFill>
+              <a:effectLst/>
+              <a:uLnTx/>
+              <a:uFillTx/>
+              <a:latin typeface="Calibri" panose="020F0502020204030204"/>
+              <a:ea typeface="+mn-ea"/>
+              <a:cs typeface="+mn-cs"/>
+            </a:endParaRPr>
+          </a:p>
+        </p:txBody>
+      </p:sp>
+      <p:sp>
+        <p:nvSpPr>
+          <p:cNvPr id="139" name="Rectangle 138">
+            <a:extLst>
+              <a:ext uri="{FF2B5EF4-FFF2-40B4-BE49-F238E27FC236}">
+                <a16:creationId xmlns:a16="http://schemas.microsoft.com/office/drawing/2014/main" id="{79F3C543-62EC-4433-9C93-A2CD8764E9B4}"/>
+              </a:ext>
+              <a:ext uri="{C183D7F6-B498-43B3-948B-1728B52AA6E4}">
+                <adec:decorative xmlns:adec="http://schemas.microsoft.com/office/drawing/2017/decorative" val="1"/>
+              </a:ext>
+            </a:extLst>
+          </p:cNvPr>
+          <p:cNvSpPr>
+            <a:spLocks noGrp="1" noRot="1" noChangeAspect="1" noMove="1" noResize="1" noEditPoints="1" noAdjustHandles="1" noChangeArrowheads="1" noChangeShapeType="1" noTextEdit="1"/>
+          </p:cNvSpPr>
+          <p:nvPr>
+            <p:extLst>
+              <p:ext uri="{386F3935-93C4-4BCD-93E2-E3B085C9AB24}">
+                <p16:designElem xmlns:p16="http://schemas.microsoft.com/office/powerpoint/2015/main" val="1"/>
+              </p:ext>
+            </p:extLst>
+          </p:nvPr>
+        </p:nvSpPr>
+        <p:spPr>
+          <a:xfrm flipV="1">
+            <a:off x="578652" y="4501201"/>
+            <a:ext cx="11034696" cy="18288"/>
+          </a:xfrm>
+          <a:prstGeom prst="rect">
+            <a:avLst/>
+          </a:prstGeom>
+          <a:solidFill>
+            <a:schemeClr val="tx2">
+              <a:lumMod val="25000"/>
+              <a:lumOff val="75000"/>
+            </a:schemeClr>
+          </a:solidFill>
+          <a:ln w="3175">
+            <a:noFill/>
+          </a:ln>
+          <a:effectLst/>
+        </p:spPr>
+        <p:style>
+          <a:lnRef idx="2">
+            <a:schemeClr val="accent1">
+              <a:shade val="50000"/>
+            </a:schemeClr>
+          </a:lnRef>
+          <a:fillRef idx="1">
+            <a:schemeClr val="accent1"/>
+          </a:fillRef>
+          <a:effectRef idx="0">
+            <a:schemeClr val="accent1"/>
+          </a:effectRef>
+          <a:fontRef idx="minor">
+            <a:schemeClr val="lt1"/>
+          </a:fontRef>
+        </p:style>
+        <p:txBody>
+          <a:bodyPr rtlCol="0" anchor="ctr"/>
+          <a:lstStyle/>
+          <a:p>
+            <a:pPr marL="0" marR="0" lvl="0" indent="0" algn="ctr" defTabSz="914400" rtl="0" eaLnBrk="1" fontAlgn="auto" latinLnBrk="0" hangingPunct="1">
+              <a:lnSpc>
+                <a:spcPct val="100000"/>
+              </a:lnSpc>
+              <a:spcBef>
+                <a:spcPts val="0"/>
+              </a:spcBef>
+              <a:spcAft>
+                <a:spcPts val="0"/>
+              </a:spcAft>
+              <a:buClrTx/>
+              <a:buSzTx/>
+              <a:buFontTx/>
+              <a:buNone/>
+              <a:tabLst/>
+              <a:defRPr/>
+            </a:pPr>
+            <a:endParaRPr kumimoji="0" lang="en-US" sz="1800" b="0" i="0" u="none" strike="noStrike" kern="1200" cap="none" spc="0" normalizeH="0" baseline="0" noProof="0">
+              <a:ln>
+                <a:noFill/>
+              </a:ln>
+              <a:solidFill>
+                <a:prstClr val="white"/>
+              </a:solidFill>
+              <a:effectLst/>
+              <a:uLnTx/>
+              <a:uFillTx/>
+              <a:latin typeface="Calibri" panose="020F0502020204030204"/>
+              <a:ea typeface="+mn-ea"/>
+              <a:cs typeface="+mn-cs"/>
+            </a:endParaRPr>
+          </a:p>
+        </p:txBody>
+      </p:sp>
+      <p:sp useBgFill="1">
+        <p:nvSpPr>
+          <p:cNvPr id="141" name="Rectangle 140">
             <a:extLst>
               <a:ext uri="{FF2B5EF4-FFF2-40B4-BE49-F238E27FC236}">
                 <a16:creationId xmlns:a16="http://schemas.microsoft.com/office/drawing/2014/main" id="{5DCB5928-DC7D-4612-9922-441966E15627}"/>
@@ -21133,7 +22626,7 @@
       </p:sp>
       <p:sp useBgFill="1">
         <p:nvSpPr>
-          <p:cNvPr id="16" name="Freeform: Shape 15">
+          <p:cNvPr id="143" name="Freeform: Shape 142">
             <a:extLst>
               <a:ext uri="{FF2B5EF4-FFF2-40B4-BE49-F238E27FC236}">
                 <a16:creationId xmlns:a16="http://schemas.microsoft.com/office/drawing/2014/main" id="{682C1161-1736-45EC-99B7-33F3CAE9D517}"/>
@@ -21308,7 +22801,7 @@
       </p:sp>
       <p:sp useBgFill="1">
         <p:nvSpPr>
-          <p:cNvPr id="18" name="Freeform: Shape 17">
+          <p:cNvPr id="145" name="Freeform: Shape 144">
             <a:extLst>
               <a:ext uri="{FF2B5EF4-FFF2-40B4-BE49-F238E27FC236}">
                 <a16:creationId xmlns:a16="http://schemas.microsoft.com/office/drawing/2014/main" id="{84D4DDB8-B68F-45B0-9F62-C4279996F672}"/>
@@ -21506,7 +22999,7 @@
       </p:sp>
       <p:sp>
         <p:nvSpPr>
-          <p:cNvPr id="20" name="Rectangle 19">
+          <p:cNvPr id="147" name="Rectangle 146">
             <a:extLst>
               <a:ext uri="{FF2B5EF4-FFF2-40B4-BE49-F238E27FC236}">
                 <a16:creationId xmlns:a16="http://schemas.microsoft.com/office/drawing/2014/main" id="{AF2F604E-43BE-4DC3-B983-E071523364F8}"/>
@@ -21598,7 +23091,7 @@
       </p:sp>
       <p:sp>
         <p:nvSpPr>
-          <p:cNvPr id="22" name="Rectangle 21">
+          <p:cNvPr id="149" name="Rectangle 148">
             <a:extLst>
               <a:ext uri="{FF2B5EF4-FFF2-40B4-BE49-F238E27FC236}">
                 <a16:creationId xmlns:a16="http://schemas.microsoft.com/office/drawing/2014/main" id="{08C9B587-E65E-4B52-B37C-ABEBB6E87928}"/>
@@ -21694,15 +23187,15 @@
       </p:sp>
       <p:pic>
         <p:nvPicPr>
-          <p:cNvPr id="5" name="Content Placeholder 4" descr="Chart, bar chart&#10;&#10;Description automatically generated">
+          <p:cNvPr id="3076" name="Picture 4">
             <a:extLst>
               <a:ext uri="{FF2B5EF4-FFF2-40B4-BE49-F238E27FC236}">
-                <a16:creationId xmlns:a16="http://schemas.microsoft.com/office/drawing/2014/main" id="{10C05960-AE7B-489B-B16B-29E0A485B0C9}"/>
+                <a16:creationId xmlns:a16="http://schemas.microsoft.com/office/drawing/2014/main" id="{8D2E70B5-4644-4AB1-9991-715C3AD08046}"/>
               </a:ext>
             </a:extLst>
           </p:cNvPr>
           <p:cNvPicPr>
-            <a:picLocks noGrp="1" noChangeAspect="1"/>
+            <a:picLocks noGrp="1" noChangeAspect="1" noChangeArrowheads="1"/>
           </p:cNvPicPr>
           <p:nvPr>
             <p:ph idx="1"/>
@@ -21720,16 +23213,75 @@
             <a:fillRect/>
           </a:stretch>
         </p:blipFill>
-        <p:spPr>
+        <p:spPr bwMode="auto">
           <a:xfrm>
-            <a:off x="5414356" y="910005"/>
-            <a:ext cx="6408836" cy="4886737"/>
+            <a:off x="5414356" y="1222436"/>
+            <a:ext cx="6408836" cy="4261875"/>
           </a:xfrm>
           <a:prstGeom prst="rect">
             <a:avLst/>
           </a:prstGeom>
+          <a:noFill/>
+          <a:extLst>
+            <a:ext uri="{909E8E84-426E-40DD-AFC4-6F175D3DCCD1}">
+              <a14:hiddenFill xmlns:a14="http://schemas.microsoft.com/office/drawing/2010/main">
+                <a:solidFill>
+                  <a:srgbClr val="FFFFFF"/>
+                </a:solidFill>
+              </a14:hiddenFill>
+            </a:ext>
+          </a:extLst>
         </p:spPr>
       </p:pic>
+      <p:sp>
+        <p:nvSpPr>
+          <p:cNvPr id="7" name="TextBox 6">
+            <a:extLst>
+              <a:ext uri="{FF2B5EF4-FFF2-40B4-BE49-F238E27FC236}">
+                <a16:creationId xmlns:a16="http://schemas.microsoft.com/office/drawing/2014/main" id="{F2B7FB4B-6CC3-41FA-A690-7AED87203336}"/>
+              </a:ext>
+            </a:extLst>
+          </p:cNvPr>
+          <p:cNvSpPr txBox="1"/>
+          <p:nvPr/>
+        </p:nvSpPr>
+        <p:spPr>
+          <a:xfrm>
+            <a:off x="568492" y="4805366"/>
+            <a:ext cx="3581224" cy="954107"/>
+          </a:xfrm>
+          <a:prstGeom prst="rect">
+            <a:avLst/>
+          </a:prstGeom>
+          <a:noFill/>
+        </p:spPr>
+        <p:txBody>
+          <a:bodyPr wrap="square" rtlCol="0">
+            <a:spAutoFit/>
+          </a:bodyPr>
+          <a:lstStyle/>
+          <a:p>
+            <a:pPr marL="285750" indent="-285750">
+              <a:buFont typeface="Arial" panose="020B0604020202020204" pitchFamily="34" charset="0"/>
+              <a:buChar char="•"/>
+            </a:pPr>
+            <a:r>
+              <a:rPr lang="en-US" sz="1400" dirty="0"/>
+              <a:t>Manhattan barely having many homes for sales compared to other boroughs</a:t>
+            </a:r>
+          </a:p>
+          <a:p>
+            <a:pPr marL="285750" indent="-285750">
+              <a:buFont typeface="Arial" panose="020B0604020202020204" pitchFamily="34" charset="0"/>
+              <a:buChar char="•"/>
+            </a:pPr>
+            <a:r>
+              <a:rPr lang="en-US" sz="1400" dirty="0"/>
+              <a:t>Queens leading in home listings</a:t>
+            </a:r>
+          </a:p>
+        </p:txBody>
+      </p:sp>
     </p:spTree>
     <p:extLst>
       <p:ext uri="{BB962C8B-B14F-4D97-AF65-F5344CB8AC3E}">
@@ -21743,7 +23295,7 @@
 </p:sld>
 </file>
 
-<file path=ppt/slides/slide7.xml><?xml version="1.0" encoding="utf-8"?>
+<file path=ppt/slides/slide9.xml><?xml version="1.0" encoding="utf-8"?>
 <p:sld xmlns:a="http://schemas.openxmlformats.org/drawingml/2006/main" xmlns:r="http://schemas.openxmlformats.org/officeDocument/2006/relationships" xmlns:p="http://schemas.openxmlformats.org/presentationml/2006/main">
   <p:cSld>
     <p:bg>
@@ -21768,200 +23320,12 @@
           <a:chExt cx="0" cy="0"/>
         </a:xfrm>
       </p:grpSpPr>
-      <p:sp>
+      <p:sp useBgFill="1">
         <p:nvSpPr>
-          <p:cNvPr id="19" name="Rectangle 18">
+          <p:cNvPr id="4116" name="Rectangle 80">
             <a:extLst>
               <a:ext uri="{FF2B5EF4-FFF2-40B4-BE49-F238E27FC236}">
-                <a16:creationId xmlns:a16="http://schemas.microsoft.com/office/drawing/2014/main" id="{8D06CE56-3881-4ADA-8CEF-D18B02C242A3}"/>
-              </a:ext>
-              <a:ext uri="{C183D7F6-B498-43B3-948B-1728B52AA6E4}">
-                <adec:decorative xmlns:adec="http://schemas.microsoft.com/office/drawing/2017/decorative" val="1"/>
-              </a:ext>
-            </a:extLst>
-          </p:cNvPr>
-          <p:cNvSpPr>
-            <a:spLocks noGrp="1" noRot="1" noChangeAspect="1" noMove="1" noResize="1" noEditPoints="1" noAdjustHandles="1" noChangeArrowheads="1" noChangeShapeType="1" noTextEdit="1"/>
-          </p:cNvSpPr>
-          <p:nvPr>
-            <p:extLst>
-              <p:ext uri="{386F3935-93C4-4BCD-93E2-E3B085C9AB24}">
-                <p16:designElem xmlns:p16="http://schemas.microsoft.com/office/powerpoint/2015/main" val="1"/>
-              </p:ext>
-            </p:extLst>
-          </p:nvPr>
-        </p:nvSpPr>
-        <p:spPr>
-          <a:xfrm rot="5400000">
-            <a:off x="857544" y="346791"/>
-            <a:ext cx="146304" cy="704088"/>
-          </a:xfrm>
-          <a:prstGeom prst="rect">
-            <a:avLst/>
-          </a:prstGeom>
-          <a:solidFill>
-            <a:schemeClr val="accent1"/>
-          </a:solidFill>
-          <a:ln>
-            <a:noFill/>
-          </a:ln>
-        </p:spPr>
-        <p:style>
-          <a:lnRef idx="2">
-            <a:schemeClr val="accent1">
-              <a:shade val="50000"/>
-            </a:schemeClr>
-          </a:lnRef>
-          <a:fillRef idx="1">
-            <a:schemeClr val="accent1"/>
-          </a:fillRef>
-          <a:effectRef idx="0">
-            <a:schemeClr val="accent1"/>
-          </a:effectRef>
-          <a:fontRef idx="minor">
-            <a:schemeClr val="lt1"/>
-          </a:fontRef>
-        </p:style>
-        <p:txBody>
-          <a:bodyPr rtlCol="0" anchor="ctr"/>
-          <a:lstStyle/>
-          <a:p>
-            <a:pPr marL="0" marR="0" lvl="0" indent="0" algn="ctr" defTabSz="914400" rtl="0" eaLnBrk="1" fontAlgn="auto" latinLnBrk="0" hangingPunct="1">
-              <a:lnSpc>
-                <a:spcPct val="100000"/>
-              </a:lnSpc>
-              <a:spcBef>
-                <a:spcPts val="0"/>
-              </a:spcBef>
-              <a:spcAft>
-                <a:spcPts val="0"/>
-              </a:spcAft>
-              <a:buClrTx/>
-              <a:buSzTx/>
-              <a:buFontTx/>
-              <a:buNone/>
-              <a:tabLst/>
-              <a:defRPr/>
-            </a:pPr>
-            <a:endParaRPr kumimoji="0" lang="en-US" sz="1800" b="0" i="0" u="none" strike="noStrike" kern="1200" cap="none" spc="0" normalizeH="0" baseline="0" noProof="0">
-              <a:ln>
-                <a:noFill/>
-              </a:ln>
-              <a:solidFill>
-                <a:prstClr val="white"/>
-              </a:solidFill>
-              <a:effectLst/>
-              <a:uLnTx/>
-              <a:uFillTx/>
-              <a:latin typeface="Calibri" panose="020F0502020204030204"/>
-              <a:ea typeface="+mn-ea"/>
-              <a:cs typeface="+mn-cs"/>
-            </a:endParaRPr>
-          </a:p>
-        </p:txBody>
-      </p:sp>
-      <p:sp>
-        <p:nvSpPr>
-          <p:cNvPr id="21" name="Rectangle 20">
-            <a:extLst>
-              <a:ext uri="{FF2B5EF4-FFF2-40B4-BE49-F238E27FC236}">
-                <a16:creationId xmlns:a16="http://schemas.microsoft.com/office/drawing/2014/main" id="{79F3C543-62EC-4433-9C93-A2CD8764E9B4}"/>
-              </a:ext>
-              <a:ext uri="{C183D7F6-B498-43B3-948B-1728B52AA6E4}">
-                <adec:decorative xmlns:adec="http://schemas.microsoft.com/office/drawing/2017/decorative" val="1"/>
-              </a:ext>
-            </a:extLst>
-          </p:cNvPr>
-          <p:cNvSpPr>
-            <a:spLocks noGrp="1" noRot="1" noChangeAspect="1" noMove="1" noResize="1" noEditPoints="1" noAdjustHandles="1" noChangeArrowheads="1" noChangeShapeType="1" noTextEdit="1"/>
-          </p:cNvSpPr>
-          <p:nvPr>
-            <p:extLst>
-              <p:ext uri="{386F3935-93C4-4BCD-93E2-E3B085C9AB24}">
-                <p16:designElem xmlns:p16="http://schemas.microsoft.com/office/powerpoint/2015/main" val="1"/>
-              </p:ext>
-            </p:extLst>
-          </p:nvPr>
-        </p:nvSpPr>
-        <p:spPr>
-          <a:xfrm flipV="1">
-            <a:off x="578652" y="4501201"/>
-            <a:ext cx="11034696" cy="18288"/>
-          </a:xfrm>
-          <a:prstGeom prst="rect">
-            <a:avLst/>
-          </a:prstGeom>
-          <a:solidFill>
-            <a:schemeClr val="tx2">
-              <a:lumMod val="25000"/>
-              <a:lumOff val="75000"/>
-            </a:schemeClr>
-          </a:solidFill>
-          <a:ln w="3175">
-            <a:noFill/>
-          </a:ln>
-          <a:effectLst/>
-        </p:spPr>
-        <p:style>
-          <a:lnRef idx="2">
-            <a:schemeClr val="accent1">
-              <a:shade val="50000"/>
-            </a:schemeClr>
-          </a:lnRef>
-          <a:fillRef idx="1">
-            <a:schemeClr val="accent1"/>
-          </a:fillRef>
-          <a:effectRef idx="0">
-            <a:schemeClr val="accent1"/>
-          </a:effectRef>
-          <a:fontRef idx="minor">
-            <a:schemeClr val="lt1"/>
-          </a:fontRef>
-        </p:style>
-        <p:txBody>
-          <a:bodyPr rtlCol="0" anchor="ctr"/>
-          <a:lstStyle/>
-          <a:p>
-            <a:pPr marL="0" marR="0" lvl="0" indent="0" algn="ctr" defTabSz="914400" rtl="0" eaLnBrk="1" fontAlgn="auto" latinLnBrk="0" hangingPunct="1">
-              <a:lnSpc>
-                <a:spcPct val="100000"/>
-              </a:lnSpc>
-              <a:spcBef>
-                <a:spcPts val="0"/>
-              </a:spcBef>
-              <a:spcAft>
-                <a:spcPts val="0"/>
-              </a:spcAft>
-              <a:buClrTx/>
-              <a:buSzTx/>
-              <a:buFontTx/>
-              <a:buNone/>
-              <a:tabLst/>
-              <a:defRPr/>
-            </a:pPr>
-            <a:endParaRPr kumimoji="0" lang="en-US" sz="1800" b="0" i="0" u="none" strike="noStrike" kern="1200" cap="none" spc="0" normalizeH="0" baseline="0" noProof="0">
-              <a:ln>
-                <a:noFill/>
-              </a:ln>
-              <a:solidFill>
-                <a:prstClr val="white"/>
-              </a:solidFill>
-              <a:effectLst/>
-              <a:uLnTx/>
-              <a:uFillTx/>
-              <a:latin typeface="Calibri" panose="020F0502020204030204"/>
-              <a:ea typeface="+mn-ea"/>
-              <a:cs typeface="+mn-cs"/>
-            </a:endParaRPr>
-          </a:p>
-        </p:txBody>
-      </p:sp>
-      <p:sp useBgFill="1">
-        <p:nvSpPr>
-          <p:cNvPr id="23" name="Rectangle 22">
-            <a:extLst>
-              <a:ext uri="{FF2B5EF4-FFF2-40B4-BE49-F238E27FC236}">
-                <a16:creationId xmlns:a16="http://schemas.microsoft.com/office/drawing/2014/main" id="{5DCB5928-DC7D-4612-9922-441966E15627}"/>
+                <a16:creationId xmlns:a16="http://schemas.microsoft.com/office/drawing/2014/main" id="{385E1BDC-A9B0-4A87-82E3-F3187F69A802}"/>
               </a:ext>
               <a:ext uri="{C183D7F6-B498-43B3-948B-1728B52AA6E4}">
                 <adec:decorative xmlns:adec="http://schemas.microsoft.com/office/drawing/2017/decorative" val="1"/>
@@ -22018,1592 +23382,10 @@
       </p:sp>
       <p:sp useBgFill="1">
         <p:nvSpPr>
-          <p:cNvPr id="25" name="Freeform: Shape 24">
+          <p:cNvPr id="4117" name="Rectangle 83">
             <a:extLst>
               <a:ext uri="{FF2B5EF4-FFF2-40B4-BE49-F238E27FC236}">
-                <a16:creationId xmlns:a16="http://schemas.microsoft.com/office/drawing/2014/main" id="{682C1161-1736-45EC-99B7-33F3CAE9D517}"/>
-              </a:ext>
-              <a:ext uri="{C183D7F6-B498-43B3-948B-1728B52AA6E4}">
-                <adec:decorative xmlns:adec="http://schemas.microsoft.com/office/drawing/2017/decorative" val="1"/>
-              </a:ext>
-            </a:extLst>
-          </p:cNvPr>
-          <p:cNvSpPr>
-            <a:spLocks noGrp="1" noRot="1" noChangeAspect="1" noMove="1" noResize="1" noEditPoints="1" noAdjustHandles="1" noChangeArrowheads="1" noChangeShapeType="1" noTextEdit="1"/>
-          </p:cNvSpPr>
-          <p:nvPr>
-            <p:extLst>
-              <p:ext uri="{386F3935-93C4-4BCD-93E2-E3B085C9AB24}">
-                <p16:designElem xmlns:p16="http://schemas.microsoft.com/office/powerpoint/2015/main" val="1"/>
-              </p:ext>
-            </p:extLst>
-          </p:nvPr>
-        </p:nvSpPr>
-        <p:spPr>
-          <a:xfrm>
-            <a:off x="0" y="0"/>
-            <a:ext cx="4959047" cy="6858000"/>
-          </a:xfrm>
-          <a:custGeom>
-            <a:avLst/>
-            <a:gdLst>
-              <a:gd name="connsiteX0" fmla="*/ 0 w 4959047"/>
-              <a:gd name="connsiteY0" fmla="*/ 0 h 6858000"/>
-              <a:gd name="connsiteX1" fmla="*/ 4110127 w 4959047"/>
-              <a:gd name="connsiteY1" fmla="*/ 0 h 6858000"/>
-              <a:gd name="connsiteX2" fmla="*/ 4179024 w 4959047"/>
-              <a:gd name="connsiteY2" fmla="*/ 123368 h 6858000"/>
-              <a:gd name="connsiteX3" fmla="*/ 4959047 w 4959047"/>
-              <a:gd name="connsiteY3" fmla="*/ 3429000 h 6858000"/>
-              <a:gd name="connsiteX4" fmla="*/ 4179024 w 4959047"/>
-              <a:gd name="connsiteY4" fmla="*/ 6734633 h 6858000"/>
-              <a:gd name="connsiteX5" fmla="*/ 4110127 w 4959047"/>
-              <a:gd name="connsiteY5" fmla="*/ 6858000 h 6858000"/>
-              <a:gd name="connsiteX6" fmla="*/ 0 w 4959047"/>
-              <a:gd name="connsiteY6" fmla="*/ 6858000 h 6858000"/>
-            </a:gdLst>
-            <a:ahLst/>
-            <a:cxnLst>
-              <a:cxn ang="0">
-                <a:pos x="connsiteX0" y="connsiteY0"/>
-              </a:cxn>
-              <a:cxn ang="0">
-                <a:pos x="connsiteX1" y="connsiteY1"/>
-              </a:cxn>
-              <a:cxn ang="0">
-                <a:pos x="connsiteX2" y="connsiteY2"/>
-              </a:cxn>
-              <a:cxn ang="0">
-                <a:pos x="connsiteX3" y="connsiteY3"/>
-              </a:cxn>
-              <a:cxn ang="0">
-                <a:pos x="connsiteX4" y="connsiteY4"/>
-              </a:cxn>
-              <a:cxn ang="0">
-                <a:pos x="connsiteX5" y="connsiteY5"/>
-              </a:cxn>
-              <a:cxn ang="0">
-                <a:pos x="connsiteX6" y="connsiteY6"/>
-              </a:cxn>
-            </a:cxnLst>
-            <a:rect l="l" t="t" r="r" b="b"/>
-            <a:pathLst>
-              <a:path w="4959047" h="6858000">
-                <a:moveTo>
-                  <a:pt x="0" y="0"/>
-                </a:moveTo>
-                <a:lnTo>
-                  <a:pt x="4110127" y="0"/>
-                </a:lnTo>
-                <a:lnTo>
-                  <a:pt x="4179024" y="123368"/>
-                </a:lnTo>
-                <a:cubicBezTo>
-                  <a:pt x="4668929" y="1045156"/>
-                  <a:pt x="4959047" y="2189404"/>
-                  <a:pt x="4959047" y="3429000"/>
-                </a:cubicBezTo>
-                <a:cubicBezTo>
-                  <a:pt x="4959047" y="4668597"/>
-                  <a:pt x="4668929" y="5812845"/>
-                  <a:pt x="4179024" y="6734633"/>
-                </a:cubicBezTo>
-                <a:lnTo>
-                  <a:pt x="4110127" y="6858000"/>
-                </a:lnTo>
-                <a:lnTo>
-                  <a:pt x="0" y="6858000"/>
-                </a:lnTo>
-                <a:close/>
-              </a:path>
-            </a:pathLst>
-          </a:custGeom>
-          <a:ln w="9525">
-            <a:solidFill>
-              <a:schemeClr val="tx2">
-                <a:lumMod val="10000"/>
-                <a:lumOff val="90000"/>
-              </a:schemeClr>
-            </a:solidFill>
-          </a:ln>
-          <a:effectLst>
-            <a:outerShdw blurRad="50800" dist="38100" algn="l" rotWithShape="0">
-              <a:schemeClr val="bg1">
-                <a:lumMod val="85000"/>
-                <a:alpha val="30000"/>
-              </a:schemeClr>
-            </a:outerShdw>
-          </a:effectLst>
-        </p:spPr>
-        <p:style>
-          <a:lnRef idx="2">
-            <a:schemeClr val="accent1">
-              <a:shade val="50000"/>
-            </a:schemeClr>
-          </a:lnRef>
-          <a:fillRef idx="1">
-            <a:schemeClr val="accent1"/>
-          </a:fillRef>
-          <a:effectRef idx="0">
-            <a:schemeClr val="accent1"/>
-          </a:effectRef>
-          <a:fontRef idx="minor">
-            <a:schemeClr val="lt1"/>
-          </a:fontRef>
-        </p:style>
-        <p:txBody>
-          <a:bodyPr wrap="square" rtlCol="0" anchor="ctr">
-            <a:noAutofit/>
-          </a:bodyPr>
-          <a:lstStyle/>
-          <a:p>
-            <a:pPr marL="0" marR="0" lvl="0" indent="0" algn="ctr" defTabSz="914400" rtl="0" eaLnBrk="1" fontAlgn="auto" latinLnBrk="0" hangingPunct="1">
-              <a:lnSpc>
-                <a:spcPct val="100000"/>
-              </a:lnSpc>
-              <a:spcBef>
-                <a:spcPts val="0"/>
-              </a:spcBef>
-              <a:spcAft>
-                <a:spcPts val="0"/>
-              </a:spcAft>
-              <a:buClrTx/>
-              <a:buSzTx/>
-              <a:buFontTx/>
-              <a:buNone/>
-              <a:tabLst/>
-              <a:defRPr/>
-            </a:pPr>
-            <a:endParaRPr kumimoji="0" lang="en-US" sz="1800" b="0" i="0" u="none" strike="noStrike" kern="1200" cap="none" spc="0" normalizeH="0" baseline="0" noProof="0">
-              <a:ln>
-                <a:noFill/>
-              </a:ln>
-              <a:solidFill>
-                <a:prstClr val="white"/>
-              </a:solidFill>
-              <a:effectLst/>
-              <a:uLnTx/>
-              <a:uFillTx/>
-              <a:latin typeface="Calibri" panose="020F0502020204030204"/>
-              <a:ea typeface="+mn-ea"/>
-              <a:cs typeface="+mn-cs"/>
-            </a:endParaRPr>
-          </a:p>
-        </p:txBody>
-      </p:sp>
-      <p:sp useBgFill="1">
-        <p:nvSpPr>
-          <p:cNvPr id="27" name="Freeform: Shape 26">
-            <a:extLst>
-              <a:ext uri="{FF2B5EF4-FFF2-40B4-BE49-F238E27FC236}">
-                <a16:creationId xmlns:a16="http://schemas.microsoft.com/office/drawing/2014/main" id="{84D4DDB8-B68F-45B0-9F62-C4279996F672}"/>
-              </a:ext>
-              <a:ext uri="{C183D7F6-B498-43B3-948B-1728B52AA6E4}">
-                <adec:decorative xmlns:adec="http://schemas.microsoft.com/office/drawing/2017/decorative" val="1"/>
-              </a:ext>
-            </a:extLst>
-          </p:cNvPr>
-          <p:cNvSpPr>
-            <a:spLocks noGrp="1" noRot="1" noChangeAspect="1" noMove="1" noResize="1" noEditPoints="1" noAdjustHandles="1" noChangeArrowheads="1" noChangeShapeType="1" noTextEdit="1"/>
-          </p:cNvSpPr>
-          <p:nvPr>
-            <p:extLst>
-              <p:ext uri="{386F3935-93C4-4BCD-93E2-E3B085C9AB24}">
-                <p16:designElem xmlns:p16="http://schemas.microsoft.com/office/powerpoint/2015/main" val="1"/>
-              </p:ext>
-            </p:extLst>
-          </p:nvPr>
-        </p:nvSpPr>
-        <p:spPr>
-          <a:xfrm>
-            <a:off x="0" y="0"/>
-            <a:ext cx="4948887" cy="6858000"/>
-          </a:xfrm>
-          <a:custGeom>
-            <a:avLst/>
-            <a:gdLst>
-              <a:gd name="connsiteX0" fmla="*/ 0 w 4948887"/>
-              <a:gd name="connsiteY0" fmla="*/ 0 h 6858000"/>
-              <a:gd name="connsiteX1" fmla="*/ 4099967 w 4948887"/>
-              <a:gd name="connsiteY1" fmla="*/ 0 h 6858000"/>
-              <a:gd name="connsiteX2" fmla="*/ 4168864 w 4948887"/>
-              <a:gd name="connsiteY2" fmla="*/ 123368 h 6858000"/>
-              <a:gd name="connsiteX3" fmla="*/ 4948887 w 4948887"/>
-              <a:gd name="connsiteY3" fmla="*/ 3429000 h 6858000"/>
-              <a:gd name="connsiteX4" fmla="*/ 4168864 w 4948887"/>
-              <a:gd name="connsiteY4" fmla="*/ 6734633 h 6858000"/>
-              <a:gd name="connsiteX5" fmla="*/ 4099967 w 4948887"/>
-              <a:gd name="connsiteY5" fmla="*/ 6858000 h 6858000"/>
-              <a:gd name="connsiteX6" fmla="*/ 0 w 4948887"/>
-              <a:gd name="connsiteY6" fmla="*/ 6858000 h 6858000"/>
-            </a:gdLst>
-            <a:ahLst/>
-            <a:cxnLst>
-              <a:cxn ang="0">
-                <a:pos x="connsiteX0" y="connsiteY0"/>
-              </a:cxn>
-              <a:cxn ang="0">
-                <a:pos x="connsiteX1" y="connsiteY1"/>
-              </a:cxn>
-              <a:cxn ang="0">
-                <a:pos x="connsiteX2" y="connsiteY2"/>
-              </a:cxn>
-              <a:cxn ang="0">
-                <a:pos x="connsiteX3" y="connsiteY3"/>
-              </a:cxn>
-              <a:cxn ang="0">
-                <a:pos x="connsiteX4" y="connsiteY4"/>
-              </a:cxn>
-              <a:cxn ang="0">
-                <a:pos x="connsiteX5" y="connsiteY5"/>
-              </a:cxn>
-              <a:cxn ang="0">
-                <a:pos x="connsiteX6" y="connsiteY6"/>
-              </a:cxn>
-            </a:cxnLst>
-            <a:rect l="l" t="t" r="r" b="b"/>
-            <a:pathLst>
-              <a:path w="4948887" h="6858000">
-                <a:moveTo>
-                  <a:pt x="0" y="0"/>
-                </a:moveTo>
-                <a:lnTo>
-                  <a:pt x="4099967" y="0"/>
-                </a:lnTo>
-                <a:lnTo>
-                  <a:pt x="4168864" y="123368"/>
-                </a:lnTo>
-                <a:cubicBezTo>
-                  <a:pt x="4658769" y="1045156"/>
-                  <a:pt x="4948887" y="2189404"/>
-                  <a:pt x="4948887" y="3429000"/>
-                </a:cubicBezTo>
-                <a:cubicBezTo>
-                  <a:pt x="4948887" y="4668597"/>
-                  <a:pt x="4658769" y="5812845"/>
-                  <a:pt x="4168864" y="6734633"/>
-                </a:cubicBezTo>
-                <a:lnTo>
-                  <a:pt x="4099967" y="6858000"/>
-                </a:lnTo>
-                <a:lnTo>
-                  <a:pt x="0" y="6858000"/>
-                </a:lnTo>
-                <a:close/>
-              </a:path>
-            </a:pathLst>
-          </a:custGeom>
-          <a:ln w="9525">
-            <a:noFill/>
-          </a:ln>
-          <a:effectLst/>
-        </p:spPr>
-        <p:style>
-          <a:lnRef idx="2">
-            <a:schemeClr val="accent1">
-              <a:shade val="50000"/>
-            </a:schemeClr>
-          </a:lnRef>
-          <a:fillRef idx="1">
-            <a:schemeClr val="accent1"/>
-          </a:fillRef>
-          <a:effectRef idx="0">
-            <a:schemeClr val="accent1"/>
-          </a:effectRef>
-          <a:fontRef idx="minor">
-            <a:schemeClr val="lt1"/>
-          </a:fontRef>
-        </p:style>
-        <p:txBody>
-          <a:bodyPr wrap="square" rtlCol="0" anchor="ctr">
-            <a:noAutofit/>
-          </a:bodyPr>
-          <a:lstStyle/>
-          <a:p>
-            <a:pPr marL="0" marR="0" lvl="0" indent="0" algn="ctr" defTabSz="914400" rtl="0" eaLnBrk="1" fontAlgn="auto" latinLnBrk="0" hangingPunct="1">
-              <a:lnSpc>
-                <a:spcPct val="100000"/>
-              </a:lnSpc>
-              <a:spcBef>
-                <a:spcPts val="0"/>
-              </a:spcBef>
-              <a:spcAft>
-                <a:spcPts val="0"/>
-              </a:spcAft>
-              <a:buClrTx/>
-              <a:buSzTx/>
-              <a:buFontTx/>
-              <a:buNone/>
-              <a:tabLst/>
-              <a:defRPr/>
-            </a:pPr>
-            <a:endParaRPr kumimoji="0" lang="en-US" sz="1800" b="0" i="0" u="none" strike="noStrike" kern="1200" cap="none" spc="0" normalizeH="0" baseline="0" noProof="0">
-              <a:ln>
-                <a:noFill/>
-              </a:ln>
-              <a:solidFill>
-                <a:prstClr val="white"/>
-              </a:solidFill>
-              <a:effectLst/>
-              <a:uLnTx/>
-              <a:uFillTx/>
-              <a:latin typeface="Calibri" panose="020F0502020204030204"/>
-              <a:ea typeface="+mn-ea"/>
-              <a:cs typeface="+mn-cs"/>
-            </a:endParaRPr>
-          </a:p>
-        </p:txBody>
-      </p:sp>
-      <p:sp>
-        <p:nvSpPr>
-          <p:cNvPr id="2" name="Title 1">
-            <a:extLst>
-              <a:ext uri="{FF2B5EF4-FFF2-40B4-BE49-F238E27FC236}">
-                <a16:creationId xmlns:a16="http://schemas.microsoft.com/office/drawing/2014/main" id="{0C0472DA-1B9C-45C5-B0AD-D5C8C7C209D0}"/>
-              </a:ext>
-            </a:extLst>
-          </p:cNvPr>
-          <p:cNvSpPr>
-            <a:spLocks noGrp="1"/>
-          </p:cNvSpPr>
-          <p:nvPr>
-            <p:ph type="title"/>
-          </p:nvPr>
-        </p:nvSpPr>
-        <p:spPr>
-          <a:xfrm>
-            <a:off x="477981" y="1122363"/>
-            <a:ext cx="4023360" cy="3204134"/>
-          </a:xfrm>
-        </p:spPr>
-        <p:txBody>
-          <a:bodyPr vert="horz" lIns="91440" tIns="45720" rIns="91440" bIns="45720" rtlCol="0" anchor="b">
-            <a:normAutofit/>
-          </a:bodyPr>
-          <a:lstStyle/>
-          <a:p>
-            <a:r>
-              <a:rPr lang="en-US" sz="4800"/>
-              <a:t>Location Impact</a:t>
-            </a:r>
-          </a:p>
-        </p:txBody>
-      </p:sp>
-      <p:sp>
-        <p:nvSpPr>
-          <p:cNvPr id="29" name="Rectangle 28">
-            <a:extLst>
-              <a:ext uri="{FF2B5EF4-FFF2-40B4-BE49-F238E27FC236}">
-                <a16:creationId xmlns:a16="http://schemas.microsoft.com/office/drawing/2014/main" id="{AF2F604E-43BE-4DC3-B983-E071523364F8}"/>
-              </a:ext>
-              <a:ext uri="{C183D7F6-B498-43B3-948B-1728B52AA6E4}">
-                <adec:decorative xmlns:adec="http://schemas.microsoft.com/office/drawing/2017/decorative" val="1"/>
-              </a:ext>
-            </a:extLst>
-          </p:cNvPr>
-          <p:cNvSpPr>
-            <a:spLocks noGrp="1" noRot="1" noChangeAspect="1" noMove="1" noResize="1" noEditPoints="1" noAdjustHandles="1" noChangeArrowheads="1" noChangeShapeType="1" noTextEdit="1"/>
-          </p:cNvSpPr>
-          <p:nvPr>
-            <p:extLst>
-              <p:ext uri="{386F3935-93C4-4BCD-93E2-E3B085C9AB24}">
-                <p16:designElem xmlns:p16="http://schemas.microsoft.com/office/powerpoint/2015/main" val="1"/>
-              </p:ext>
-            </p:extLst>
-          </p:nvPr>
-        </p:nvSpPr>
-        <p:spPr>
-          <a:xfrm rot="5400000">
-            <a:off x="759921" y="346791"/>
-            <a:ext cx="146304" cy="704088"/>
-          </a:xfrm>
-          <a:prstGeom prst="rect">
-            <a:avLst/>
-          </a:prstGeom>
-          <a:solidFill>
-            <a:schemeClr val="accent1"/>
-          </a:solidFill>
-          <a:ln>
-            <a:noFill/>
-          </a:ln>
-        </p:spPr>
-        <p:style>
-          <a:lnRef idx="2">
-            <a:schemeClr val="accent1">
-              <a:shade val="50000"/>
-            </a:schemeClr>
-          </a:lnRef>
-          <a:fillRef idx="1">
-            <a:schemeClr val="accent1"/>
-          </a:fillRef>
-          <a:effectRef idx="0">
-            <a:schemeClr val="accent1"/>
-          </a:effectRef>
-          <a:fontRef idx="minor">
-            <a:schemeClr val="lt1"/>
-          </a:fontRef>
-        </p:style>
-        <p:txBody>
-          <a:bodyPr rtlCol="0" anchor="ctr"/>
-          <a:lstStyle/>
-          <a:p>
-            <a:pPr marL="0" marR="0" lvl="0" indent="0" algn="ctr" defTabSz="914400" rtl="0" eaLnBrk="1" fontAlgn="auto" latinLnBrk="0" hangingPunct="1">
-              <a:lnSpc>
-                <a:spcPct val="100000"/>
-              </a:lnSpc>
-              <a:spcBef>
-                <a:spcPts val="0"/>
-              </a:spcBef>
-              <a:spcAft>
-                <a:spcPts val="0"/>
-              </a:spcAft>
-              <a:buClrTx/>
-              <a:buSzTx/>
-              <a:buFontTx/>
-              <a:buNone/>
-              <a:tabLst/>
-              <a:defRPr/>
-            </a:pPr>
-            <a:endParaRPr kumimoji="0" lang="en-US" sz="1800" b="0" i="0" u="none" strike="noStrike" kern="1200" cap="none" spc="0" normalizeH="0" baseline="0" noProof="0">
-              <a:ln>
-                <a:noFill/>
-              </a:ln>
-              <a:solidFill>
-                <a:prstClr val="white"/>
-              </a:solidFill>
-              <a:effectLst/>
-              <a:uLnTx/>
-              <a:uFillTx/>
-              <a:latin typeface="Calibri" panose="020F0502020204030204"/>
-              <a:ea typeface="+mn-ea"/>
-              <a:cs typeface="+mn-cs"/>
-            </a:endParaRPr>
-          </a:p>
-        </p:txBody>
-      </p:sp>
-      <p:sp>
-        <p:nvSpPr>
-          <p:cNvPr id="31" name="Rectangle 30">
-            <a:extLst>
-              <a:ext uri="{FF2B5EF4-FFF2-40B4-BE49-F238E27FC236}">
-                <a16:creationId xmlns:a16="http://schemas.microsoft.com/office/drawing/2014/main" id="{08C9B587-E65E-4B52-B37C-ABEBB6E87928}"/>
-              </a:ext>
-              <a:ext uri="{C183D7F6-B498-43B3-948B-1728B52AA6E4}">
-                <adec:decorative xmlns:adec="http://schemas.microsoft.com/office/drawing/2017/decorative" val="1"/>
-              </a:ext>
-            </a:extLst>
-          </p:cNvPr>
-          <p:cNvSpPr>
-            <a:spLocks noGrp="1" noRot="1" noChangeAspect="1" noMove="1" noResize="1" noEditPoints="1" noAdjustHandles="1" noChangeArrowheads="1" noChangeShapeType="1" noTextEdit="1"/>
-          </p:cNvSpPr>
-          <p:nvPr>
-            <p:extLst>
-              <p:ext uri="{386F3935-93C4-4BCD-93E2-E3B085C9AB24}">
-                <p16:designElem xmlns:p16="http://schemas.microsoft.com/office/powerpoint/2015/main" val="1"/>
-              </p:ext>
-            </p:extLst>
-          </p:nvPr>
-        </p:nvSpPr>
-        <p:spPr>
-          <a:xfrm>
-            <a:off x="481029" y="4546920"/>
-            <a:ext cx="4023360" cy="18288"/>
-          </a:xfrm>
-          <a:prstGeom prst="rect">
-            <a:avLst/>
-          </a:prstGeom>
-          <a:solidFill>
-            <a:schemeClr val="tx2">
-              <a:lumMod val="25000"/>
-              <a:lumOff val="75000"/>
-            </a:schemeClr>
-          </a:solidFill>
-          <a:ln w="3175">
-            <a:noFill/>
-          </a:ln>
-          <a:effectLst/>
-        </p:spPr>
-        <p:style>
-          <a:lnRef idx="2">
-            <a:schemeClr val="accent1">
-              <a:shade val="50000"/>
-            </a:schemeClr>
-          </a:lnRef>
-          <a:fillRef idx="1">
-            <a:schemeClr val="accent1"/>
-          </a:fillRef>
-          <a:effectRef idx="0">
-            <a:schemeClr val="accent1"/>
-          </a:effectRef>
-          <a:fontRef idx="minor">
-            <a:schemeClr val="lt1"/>
-          </a:fontRef>
-        </p:style>
-        <p:txBody>
-          <a:bodyPr rtlCol="0" anchor="ctr"/>
-          <a:lstStyle/>
-          <a:p>
-            <a:pPr marL="0" marR="0" lvl="0" indent="0" algn="ctr" defTabSz="914400" rtl="0" eaLnBrk="1" fontAlgn="auto" latinLnBrk="0" hangingPunct="1">
-              <a:lnSpc>
-                <a:spcPct val="100000"/>
-              </a:lnSpc>
-              <a:spcBef>
-                <a:spcPts val="0"/>
-              </a:spcBef>
-              <a:spcAft>
-                <a:spcPts val="0"/>
-              </a:spcAft>
-              <a:buClrTx/>
-              <a:buSzTx/>
-              <a:buFontTx/>
-              <a:buNone/>
-              <a:tabLst/>
-              <a:defRPr/>
-            </a:pPr>
-            <a:endParaRPr kumimoji="0" lang="en-US" sz="1800" b="0" i="0" u="none" strike="noStrike" kern="1200" cap="none" spc="0" normalizeH="0" baseline="0" noProof="0">
-              <a:ln>
-                <a:noFill/>
-              </a:ln>
-              <a:solidFill>
-                <a:prstClr val="white"/>
-              </a:solidFill>
-              <a:effectLst/>
-              <a:uLnTx/>
-              <a:uFillTx/>
-              <a:latin typeface="Calibri" panose="020F0502020204030204"/>
-              <a:ea typeface="+mn-ea"/>
-              <a:cs typeface="+mn-cs"/>
-            </a:endParaRPr>
-          </a:p>
-        </p:txBody>
-      </p:sp>
-      <p:pic>
-        <p:nvPicPr>
-          <p:cNvPr id="5" name="Content Placeholder 4" descr="Chart, bar chart&#10;&#10;Description automatically generated">
-            <a:extLst>
-              <a:ext uri="{FF2B5EF4-FFF2-40B4-BE49-F238E27FC236}">
-                <a16:creationId xmlns:a16="http://schemas.microsoft.com/office/drawing/2014/main" id="{2448996B-AE59-4493-9A10-53DC3DFE6F89}"/>
-              </a:ext>
-            </a:extLst>
-          </p:cNvPr>
-          <p:cNvPicPr>
-            <a:picLocks noGrp="1" noChangeAspect="1"/>
-          </p:cNvPicPr>
-          <p:nvPr>
-            <p:ph idx="1"/>
-          </p:nvPr>
-        </p:nvPicPr>
-        <p:blipFill>
-          <a:blip r:embed="rId2">
-            <a:extLst>
-              <a:ext uri="{28A0092B-C50C-407E-A947-70E740481C1C}">
-                <a14:useLocalDpi xmlns:a14="http://schemas.microsoft.com/office/drawing/2010/main" val="0"/>
-              </a:ext>
-            </a:extLst>
-          </a:blip>
-          <a:stretch>
-            <a:fillRect/>
-          </a:stretch>
-        </p:blipFill>
-        <p:spPr>
-          <a:xfrm>
-            <a:off x="5414356" y="709729"/>
-            <a:ext cx="6408836" cy="5287289"/>
-          </a:xfrm>
-          <a:prstGeom prst="rect">
-            <a:avLst/>
-          </a:prstGeom>
-        </p:spPr>
-      </p:pic>
-    </p:spTree>
-    <p:extLst>
-      <p:ext uri="{BB962C8B-B14F-4D97-AF65-F5344CB8AC3E}">
-        <p14:creationId xmlns:p14="http://schemas.microsoft.com/office/powerpoint/2010/main" val="352554439"/>
-      </p:ext>
-    </p:extLst>
-  </p:cSld>
-  <p:clrMapOvr>
-    <a:masterClrMapping/>
-  </p:clrMapOvr>
-</p:sld>
-</file>
-
-<file path=ppt/slides/slide8.xml><?xml version="1.0" encoding="utf-8"?>
-<p:sld xmlns:a="http://schemas.openxmlformats.org/drawingml/2006/main" xmlns:r="http://schemas.openxmlformats.org/officeDocument/2006/relationships" xmlns:p="http://schemas.openxmlformats.org/presentationml/2006/main">
-  <p:cSld>
-    <p:bg>
-      <p:bgPr>
-        <a:solidFill>
-          <a:schemeClr val="bg1"/>
-        </a:solidFill>
-        <a:effectLst/>
-      </p:bgPr>
-    </p:bg>
-    <p:spTree>
-      <p:nvGrpSpPr>
-        <p:cNvPr id="1" name=""/>
-        <p:cNvGrpSpPr/>
-        <p:nvPr/>
-      </p:nvGrpSpPr>
-      <p:grpSpPr>
-        <a:xfrm>
-          <a:off x="0" y="0"/>
-          <a:ext cx="0" cy="0"/>
-          <a:chOff x="0" y="0"/>
-          <a:chExt cx="0" cy="0"/>
-        </a:xfrm>
-      </p:grpSpPr>
-      <p:sp>
-        <p:nvSpPr>
-          <p:cNvPr id="10" name="Rectangle 9">
-            <a:extLst>
-              <a:ext uri="{FF2B5EF4-FFF2-40B4-BE49-F238E27FC236}">
-                <a16:creationId xmlns:a16="http://schemas.microsoft.com/office/drawing/2014/main" id="{8D06CE56-3881-4ADA-8CEF-D18B02C242A3}"/>
-              </a:ext>
-              <a:ext uri="{C183D7F6-B498-43B3-948B-1728B52AA6E4}">
-                <adec:decorative xmlns:adec="http://schemas.microsoft.com/office/drawing/2017/decorative" val="1"/>
-              </a:ext>
-            </a:extLst>
-          </p:cNvPr>
-          <p:cNvSpPr>
-            <a:spLocks noGrp="1" noRot="1" noChangeAspect="1" noMove="1" noResize="1" noEditPoints="1" noAdjustHandles="1" noChangeArrowheads="1" noChangeShapeType="1" noTextEdit="1"/>
-          </p:cNvSpPr>
-          <p:nvPr>
-            <p:extLst>
-              <p:ext uri="{386F3935-93C4-4BCD-93E2-E3B085C9AB24}">
-                <p16:designElem xmlns:p16="http://schemas.microsoft.com/office/powerpoint/2015/main" val="1"/>
-              </p:ext>
-            </p:extLst>
-          </p:nvPr>
-        </p:nvSpPr>
-        <p:spPr>
-          <a:xfrm rot="5400000">
-            <a:off x="857544" y="346791"/>
-            <a:ext cx="146304" cy="704088"/>
-          </a:xfrm>
-          <a:prstGeom prst="rect">
-            <a:avLst/>
-          </a:prstGeom>
-          <a:solidFill>
-            <a:schemeClr val="accent1"/>
-          </a:solidFill>
-          <a:ln>
-            <a:noFill/>
-          </a:ln>
-        </p:spPr>
-        <p:style>
-          <a:lnRef idx="2">
-            <a:schemeClr val="accent1">
-              <a:shade val="50000"/>
-            </a:schemeClr>
-          </a:lnRef>
-          <a:fillRef idx="1">
-            <a:schemeClr val="accent1"/>
-          </a:fillRef>
-          <a:effectRef idx="0">
-            <a:schemeClr val="accent1"/>
-          </a:effectRef>
-          <a:fontRef idx="minor">
-            <a:schemeClr val="lt1"/>
-          </a:fontRef>
-        </p:style>
-        <p:txBody>
-          <a:bodyPr rtlCol="0" anchor="ctr"/>
-          <a:lstStyle/>
-          <a:p>
-            <a:pPr marL="0" marR="0" lvl="0" indent="0" algn="ctr" defTabSz="914400" rtl="0" eaLnBrk="1" fontAlgn="auto" latinLnBrk="0" hangingPunct="1">
-              <a:lnSpc>
-                <a:spcPct val="100000"/>
-              </a:lnSpc>
-              <a:spcBef>
-                <a:spcPts val="0"/>
-              </a:spcBef>
-              <a:spcAft>
-                <a:spcPts val="0"/>
-              </a:spcAft>
-              <a:buClrTx/>
-              <a:buSzTx/>
-              <a:buFontTx/>
-              <a:buNone/>
-              <a:tabLst/>
-              <a:defRPr/>
-            </a:pPr>
-            <a:endParaRPr kumimoji="0" lang="en-US" sz="1800" b="0" i="0" u="none" strike="noStrike" kern="1200" cap="none" spc="0" normalizeH="0" baseline="0" noProof="0">
-              <a:ln>
-                <a:noFill/>
-              </a:ln>
-              <a:solidFill>
-                <a:prstClr val="white"/>
-              </a:solidFill>
-              <a:effectLst/>
-              <a:uLnTx/>
-              <a:uFillTx/>
-              <a:latin typeface="Calibri" panose="020F0502020204030204"/>
-              <a:ea typeface="+mn-ea"/>
-              <a:cs typeface="+mn-cs"/>
-            </a:endParaRPr>
-          </a:p>
-        </p:txBody>
-      </p:sp>
-      <p:sp>
-        <p:nvSpPr>
-          <p:cNvPr id="12" name="Rectangle 11">
-            <a:extLst>
-              <a:ext uri="{FF2B5EF4-FFF2-40B4-BE49-F238E27FC236}">
-                <a16:creationId xmlns:a16="http://schemas.microsoft.com/office/drawing/2014/main" id="{79F3C543-62EC-4433-9C93-A2CD8764E9B4}"/>
-              </a:ext>
-              <a:ext uri="{C183D7F6-B498-43B3-948B-1728B52AA6E4}">
-                <adec:decorative xmlns:adec="http://schemas.microsoft.com/office/drawing/2017/decorative" val="1"/>
-              </a:ext>
-            </a:extLst>
-          </p:cNvPr>
-          <p:cNvSpPr>
-            <a:spLocks noGrp="1" noRot="1" noChangeAspect="1" noMove="1" noResize="1" noEditPoints="1" noAdjustHandles="1" noChangeArrowheads="1" noChangeShapeType="1" noTextEdit="1"/>
-          </p:cNvSpPr>
-          <p:nvPr>
-            <p:extLst>
-              <p:ext uri="{386F3935-93C4-4BCD-93E2-E3B085C9AB24}">
-                <p16:designElem xmlns:p16="http://schemas.microsoft.com/office/powerpoint/2015/main" val="1"/>
-              </p:ext>
-            </p:extLst>
-          </p:nvPr>
-        </p:nvSpPr>
-        <p:spPr>
-          <a:xfrm flipV="1">
-            <a:off x="578652" y="4501201"/>
-            <a:ext cx="11034696" cy="18288"/>
-          </a:xfrm>
-          <a:prstGeom prst="rect">
-            <a:avLst/>
-          </a:prstGeom>
-          <a:solidFill>
-            <a:schemeClr val="tx2">
-              <a:lumMod val="25000"/>
-              <a:lumOff val="75000"/>
-            </a:schemeClr>
-          </a:solidFill>
-          <a:ln w="3175">
-            <a:noFill/>
-          </a:ln>
-          <a:effectLst/>
-        </p:spPr>
-        <p:style>
-          <a:lnRef idx="2">
-            <a:schemeClr val="accent1">
-              <a:shade val="50000"/>
-            </a:schemeClr>
-          </a:lnRef>
-          <a:fillRef idx="1">
-            <a:schemeClr val="accent1"/>
-          </a:fillRef>
-          <a:effectRef idx="0">
-            <a:schemeClr val="accent1"/>
-          </a:effectRef>
-          <a:fontRef idx="minor">
-            <a:schemeClr val="lt1"/>
-          </a:fontRef>
-        </p:style>
-        <p:txBody>
-          <a:bodyPr rtlCol="0" anchor="ctr"/>
-          <a:lstStyle/>
-          <a:p>
-            <a:pPr marL="0" marR="0" lvl="0" indent="0" algn="ctr" defTabSz="914400" rtl="0" eaLnBrk="1" fontAlgn="auto" latinLnBrk="0" hangingPunct="1">
-              <a:lnSpc>
-                <a:spcPct val="100000"/>
-              </a:lnSpc>
-              <a:spcBef>
-                <a:spcPts val="0"/>
-              </a:spcBef>
-              <a:spcAft>
-                <a:spcPts val="0"/>
-              </a:spcAft>
-              <a:buClrTx/>
-              <a:buSzTx/>
-              <a:buFontTx/>
-              <a:buNone/>
-              <a:tabLst/>
-              <a:defRPr/>
-            </a:pPr>
-            <a:endParaRPr kumimoji="0" lang="en-US" sz="1800" b="0" i="0" u="none" strike="noStrike" kern="1200" cap="none" spc="0" normalizeH="0" baseline="0" noProof="0">
-              <a:ln>
-                <a:noFill/>
-              </a:ln>
-              <a:solidFill>
-                <a:prstClr val="white"/>
-              </a:solidFill>
-              <a:effectLst/>
-              <a:uLnTx/>
-              <a:uFillTx/>
-              <a:latin typeface="Calibri" panose="020F0502020204030204"/>
-              <a:ea typeface="+mn-ea"/>
-              <a:cs typeface="+mn-cs"/>
-            </a:endParaRPr>
-          </a:p>
-        </p:txBody>
-      </p:sp>
-      <p:sp useBgFill="1">
-        <p:nvSpPr>
-          <p:cNvPr id="14" name="Rectangle 13">
-            <a:extLst>
-              <a:ext uri="{FF2B5EF4-FFF2-40B4-BE49-F238E27FC236}">
-                <a16:creationId xmlns:a16="http://schemas.microsoft.com/office/drawing/2014/main" id="{5DCB5928-DC7D-4612-9922-441966E15627}"/>
-              </a:ext>
-              <a:ext uri="{C183D7F6-B498-43B3-948B-1728B52AA6E4}">
-                <adec:decorative xmlns:adec="http://schemas.microsoft.com/office/drawing/2017/decorative" val="1"/>
-              </a:ext>
-            </a:extLst>
-          </p:cNvPr>
-          <p:cNvSpPr>
-            <a:spLocks noGrp="1" noRot="1" noChangeAspect="1" noMove="1" noResize="1" noEditPoints="1" noAdjustHandles="1" noChangeArrowheads="1" noChangeShapeType="1" noTextEdit="1"/>
-          </p:cNvSpPr>
-          <p:nvPr>
-            <p:extLst>
-              <p:ext uri="{386F3935-93C4-4BCD-93E2-E3B085C9AB24}">
-                <p16:designElem xmlns:p16="http://schemas.microsoft.com/office/powerpoint/2015/main" val="1"/>
-              </p:ext>
-            </p:extLst>
-          </p:nvPr>
-        </p:nvSpPr>
-        <p:spPr>
-          <a:xfrm>
-            <a:off x="0" y="0"/>
-            <a:ext cx="12192000" cy="6858000"/>
-          </a:xfrm>
-          <a:prstGeom prst="rect">
-            <a:avLst/>
-          </a:prstGeom>
-          <a:ln>
-            <a:noFill/>
-          </a:ln>
-        </p:spPr>
-        <p:style>
-          <a:lnRef idx="2">
-            <a:schemeClr val="accent1">
-              <a:shade val="50000"/>
-            </a:schemeClr>
-          </a:lnRef>
-          <a:fillRef idx="1">
-            <a:schemeClr val="accent1"/>
-          </a:fillRef>
-          <a:effectRef idx="0">
-            <a:schemeClr val="accent1"/>
-          </a:effectRef>
-          <a:fontRef idx="minor">
-            <a:schemeClr val="lt1"/>
-          </a:fontRef>
-        </p:style>
-        <p:txBody>
-          <a:bodyPr rtlCol="0" anchor="ctr"/>
-          <a:lstStyle/>
-          <a:p>
-            <a:pPr algn="ctr"/>
-            <a:endParaRPr lang="en-US"/>
-          </a:p>
-        </p:txBody>
-      </p:sp>
-      <p:sp useBgFill="1">
-        <p:nvSpPr>
-          <p:cNvPr id="16" name="Freeform: Shape 15">
-            <a:extLst>
-              <a:ext uri="{FF2B5EF4-FFF2-40B4-BE49-F238E27FC236}">
-                <a16:creationId xmlns:a16="http://schemas.microsoft.com/office/drawing/2014/main" id="{682C1161-1736-45EC-99B7-33F3CAE9D517}"/>
-              </a:ext>
-              <a:ext uri="{C183D7F6-B498-43B3-948B-1728B52AA6E4}">
-                <adec:decorative xmlns:adec="http://schemas.microsoft.com/office/drawing/2017/decorative" val="1"/>
-              </a:ext>
-            </a:extLst>
-          </p:cNvPr>
-          <p:cNvSpPr>
-            <a:spLocks noGrp="1" noRot="1" noChangeAspect="1" noMove="1" noResize="1" noEditPoints="1" noAdjustHandles="1" noChangeArrowheads="1" noChangeShapeType="1" noTextEdit="1"/>
-          </p:cNvSpPr>
-          <p:nvPr>
-            <p:extLst>
-              <p:ext uri="{386F3935-93C4-4BCD-93E2-E3B085C9AB24}">
-                <p16:designElem xmlns:p16="http://schemas.microsoft.com/office/powerpoint/2015/main" val="1"/>
-              </p:ext>
-            </p:extLst>
-          </p:nvPr>
-        </p:nvSpPr>
-        <p:spPr>
-          <a:xfrm>
-            <a:off x="0" y="0"/>
-            <a:ext cx="4959047" cy="6858000"/>
-          </a:xfrm>
-          <a:custGeom>
-            <a:avLst/>
-            <a:gdLst>
-              <a:gd name="connsiteX0" fmla="*/ 0 w 4959047"/>
-              <a:gd name="connsiteY0" fmla="*/ 0 h 6858000"/>
-              <a:gd name="connsiteX1" fmla="*/ 4110127 w 4959047"/>
-              <a:gd name="connsiteY1" fmla="*/ 0 h 6858000"/>
-              <a:gd name="connsiteX2" fmla="*/ 4179024 w 4959047"/>
-              <a:gd name="connsiteY2" fmla="*/ 123368 h 6858000"/>
-              <a:gd name="connsiteX3" fmla="*/ 4959047 w 4959047"/>
-              <a:gd name="connsiteY3" fmla="*/ 3429000 h 6858000"/>
-              <a:gd name="connsiteX4" fmla="*/ 4179024 w 4959047"/>
-              <a:gd name="connsiteY4" fmla="*/ 6734633 h 6858000"/>
-              <a:gd name="connsiteX5" fmla="*/ 4110127 w 4959047"/>
-              <a:gd name="connsiteY5" fmla="*/ 6858000 h 6858000"/>
-              <a:gd name="connsiteX6" fmla="*/ 0 w 4959047"/>
-              <a:gd name="connsiteY6" fmla="*/ 6858000 h 6858000"/>
-            </a:gdLst>
-            <a:ahLst/>
-            <a:cxnLst>
-              <a:cxn ang="0">
-                <a:pos x="connsiteX0" y="connsiteY0"/>
-              </a:cxn>
-              <a:cxn ang="0">
-                <a:pos x="connsiteX1" y="connsiteY1"/>
-              </a:cxn>
-              <a:cxn ang="0">
-                <a:pos x="connsiteX2" y="connsiteY2"/>
-              </a:cxn>
-              <a:cxn ang="0">
-                <a:pos x="connsiteX3" y="connsiteY3"/>
-              </a:cxn>
-              <a:cxn ang="0">
-                <a:pos x="connsiteX4" y="connsiteY4"/>
-              </a:cxn>
-              <a:cxn ang="0">
-                <a:pos x="connsiteX5" y="connsiteY5"/>
-              </a:cxn>
-              <a:cxn ang="0">
-                <a:pos x="connsiteX6" y="connsiteY6"/>
-              </a:cxn>
-            </a:cxnLst>
-            <a:rect l="l" t="t" r="r" b="b"/>
-            <a:pathLst>
-              <a:path w="4959047" h="6858000">
-                <a:moveTo>
-                  <a:pt x="0" y="0"/>
-                </a:moveTo>
-                <a:lnTo>
-                  <a:pt x="4110127" y="0"/>
-                </a:lnTo>
-                <a:lnTo>
-                  <a:pt x="4179024" y="123368"/>
-                </a:lnTo>
-                <a:cubicBezTo>
-                  <a:pt x="4668929" y="1045156"/>
-                  <a:pt x="4959047" y="2189404"/>
-                  <a:pt x="4959047" y="3429000"/>
-                </a:cubicBezTo>
-                <a:cubicBezTo>
-                  <a:pt x="4959047" y="4668597"/>
-                  <a:pt x="4668929" y="5812845"/>
-                  <a:pt x="4179024" y="6734633"/>
-                </a:cubicBezTo>
-                <a:lnTo>
-                  <a:pt x="4110127" y="6858000"/>
-                </a:lnTo>
-                <a:lnTo>
-                  <a:pt x="0" y="6858000"/>
-                </a:lnTo>
-                <a:close/>
-              </a:path>
-            </a:pathLst>
-          </a:custGeom>
-          <a:ln w="9525">
-            <a:solidFill>
-              <a:schemeClr val="tx2">
-                <a:lumMod val="10000"/>
-                <a:lumOff val="90000"/>
-              </a:schemeClr>
-            </a:solidFill>
-          </a:ln>
-          <a:effectLst>
-            <a:outerShdw blurRad="50800" dist="38100" algn="l" rotWithShape="0">
-              <a:schemeClr val="bg1">
-                <a:lumMod val="85000"/>
-                <a:alpha val="30000"/>
-              </a:schemeClr>
-            </a:outerShdw>
-          </a:effectLst>
-        </p:spPr>
-        <p:style>
-          <a:lnRef idx="2">
-            <a:schemeClr val="accent1">
-              <a:shade val="50000"/>
-            </a:schemeClr>
-          </a:lnRef>
-          <a:fillRef idx="1">
-            <a:schemeClr val="accent1"/>
-          </a:fillRef>
-          <a:effectRef idx="0">
-            <a:schemeClr val="accent1"/>
-          </a:effectRef>
-          <a:fontRef idx="minor">
-            <a:schemeClr val="lt1"/>
-          </a:fontRef>
-        </p:style>
-        <p:txBody>
-          <a:bodyPr wrap="square" rtlCol="0" anchor="ctr">
-            <a:noAutofit/>
-          </a:bodyPr>
-          <a:lstStyle/>
-          <a:p>
-            <a:pPr marL="0" marR="0" lvl="0" indent="0" algn="ctr" defTabSz="914400" rtl="0" eaLnBrk="1" fontAlgn="auto" latinLnBrk="0" hangingPunct="1">
-              <a:lnSpc>
-                <a:spcPct val="100000"/>
-              </a:lnSpc>
-              <a:spcBef>
-                <a:spcPts val="0"/>
-              </a:spcBef>
-              <a:spcAft>
-                <a:spcPts val="0"/>
-              </a:spcAft>
-              <a:buClrTx/>
-              <a:buSzTx/>
-              <a:buFontTx/>
-              <a:buNone/>
-              <a:tabLst/>
-              <a:defRPr/>
-            </a:pPr>
-            <a:endParaRPr kumimoji="0" lang="en-US" sz="1800" b="0" i="0" u="none" strike="noStrike" kern="1200" cap="none" spc="0" normalizeH="0" baseline="0" noProof="0">
-              <a:ln>
-                <a:noFill/>
-              </a:ln>
-              <a:solidFill>
-                <a:prstClr val="white"/>
-              </a:solidFill>
-              <a:effectLst/>
-              <a:uLnTx/>
-              <a:uFillTx/>
-              <a:latin typeface="Calibri" panose="020F0502020204030204"/>
-              <a:ea typeface="+mn-ea"/>
-              <a:cs typeface="+mn-cs"/>
-            </a:endParaRPr>
-          </a:p>
-        </p:txBody>
-      </p:sp>
-      <p:sp useBgFill="1">
-        <p:nvSpPr>
-          <p:cNvPr id="18" name="Freeform: Shape 17">
-            <a:extLst>
-              <a:ext uri="{FF2B5EF4-FFF2-40B4-BE49-F238E27FC236}">
-                <a16:creationId xmlns:a16="http://schemas.microsoft.com/office/drawing/2014/main" id="{84D4DDB8-B68F-45B0-9F62-C4279996F672}"/>
-              </a:ext>
-              <a:ext uri="{C183D7F6-B498-43B3-948B-1728B52AA6E4}">
-                <adec:decorative xmlns:adec="http://schemas.microsoft.com/office/drawing/2017/decorative" val="1"/>
-              </a:ext>
-            </a:extLst>
-          </p:cNvPr>
-          <p:cNvSpPr>
-            <a:spLocks noGrp="1" noRot="1" noChangeAspect="1" noMove="1" noResize="1" noEditPoints="1" noAdjustHandles="1" noChangeArrowheads="1" noChangeShapeType="1" noTextEdit="1"/>
-          </p:cNvSpPr>
-          <p:nvPr>
-            <p:extLst>
-              <p:ext uri="{386F3935-93C4-4BCD-93E2-E3B085C9AB24}">
-                <p16:designElem xmlns:p16="http://schemas.microsoft.com/office/powerpoint/2015/main" val="1"/>
-              </p:ext>
-            </p:extLst>
-          </p:nvPr>
-        </p:nvSpPr>
-        <p:spPr>
-          <a:xfrm>
-            <a:off x="0" y="0"/>
-            <a:ext cx="4948887" cy="6858000"/>
-          </a:xfrm>
-          <a:custGeom>
-            <a:avLst/>
-            <a:gdLst>
-              <a:gd name="connsiteX0" fmla="*/ 0 w 4948887"/>
-              <a:gd name="connsiteY0" fmla="*/ 0 h 6858000"/>
-              <a:gd name="connsiteX1" fmla="*/ 4099967 w 4948887"/>
-              <a:gd name="connsiteY1" fmla="*/ 0 h 6858000"/>
-              <a:gd name="connsiteX2" fmla="*/ 4168864 w 4948887"/>
-              <a:gd name="connsiteY2" fmla="*/ 123368 h 6858000"/>
-              <a:gd name="connsiteX3" fmla="*/ 4948887 w 4948887"/>
-              <a:gd name="connsiteY3" fmla="*/ 3429000 h 6858000"/>
-              <a:gd name="connsiteX4" fmla="*/ 4168864 w 4948887"/>
-              <a:gd name="connsiteY4" fmla="*/ 6734633 h 6858000"/>
-              <a:gd name="connsiteX5" fmla="*/ 4099967 w 4948887"/>
-              <a:gd name="connsiteY5" fmla="*/ 6858000 h 6858000"/>
-              <a:gd name="connsiteX6" fmla="*/ 0 w 4948887"/>
-              <a:gd name="connsiteY6" fmla="*/ 6858000 h 6858000"/>
-            </a:gdLst>
-            <a:ahLst/>
-            <a:cxnLst>
-              <a:cxn ang="0">
-                <a:pos x="connsiteX0" y="connsiteY0"/>
-              </a:cxn>
-              <a:cxn ang="0">
-                <a:pos x="connsiteX1" y="connsiteY1"/>
-              </a:cxn>
-              <a:cxn ang="0">
-                <a:pos x="connsiteX2" y="connsiteY2"/>
-              </a:cxn>
-              <a:cxn ang="0">
-                <a:pos x="connsiteX3" y="connsiteY3"/>
-              </a:cxn>
-              <a:cxn ang="0">
-                <a:pos x="connsiteX4" y="connsiteY4"/>
-              </a:cxn>
-              <a:cxn ang="0">
-                <a:pos x="connsiteX5" y="connsiteY5"/>
-              </a:cxn>
-              <a:cxn ang="0">
-                <a:pos x="connsiteX6" y="connsiteY6"/>
-              </a:cxn>
-            </a:cxnLst>
-            <a:rect l="l" t="t" r="r" b="b"/>
-            <a:pathLst>
-              <a:path w="4948887" h="6858000">
-                <a:moveTo>
-                  <a:pt x="0" y="0"/>
-                </a:moveTo>
-                <a:lnTo>
-                  <a:pt x="4099967" y="0"/>
-                </a:lnTo>
-                <a:lnTo>
-                  <a:pt x="4168864" y="123368"/>
-                </a:lnTo>
-                <a:cubicBezTo>
-                  <a:pt x="4658769" y="1045156"/>
-                  <a:pt x="4948887" y="2189404"/>
-                  <a:pt x="4948887" y="3429000"/>
-                </a:cubicBezTo>
-                <a:cubicBezTo>
-                  <a:pt x="4948887" y="4668597"/>
-                  <a:pt x="4658769" y="5812845"/>
-                  <a:pt x="4168864" y="6734633"/>
-                </a:cubicBezTo>
-                <a:lnTo>
-                  <a:pt x="4099967" y="6858000"/>
-                </a:lnTo>
-                <a:lnTo>
-                  <a:pt x="0" y="6858000"/>
-                </a:lnTo>
-                <a:close/>
-              </a:path>
-            </a:pathLst>
-          </a:custGeom>
-          <a:ln w="9525">
-            <a:noFill/>
-          </a:ln>
-          <a:effectLst/>
-        </p:spPr>
-        <p:style>
-          <a:lnRef idx="2">
-            <a:schemeClr val="accent1">
-              <a:shade val="50000"/>
-            </a:schemeClr>
-          </a:lnRef>
-          <a:fillRef idx="1">
-            <a:schemeClr val="accent1"/>
-          </a:fillRef>
-          <a:effectRef idx="0">
-            <a:schemeClr val="accent1"/>
-          </a:effectRef>
-          <a:fontRef idx="minor">
-            <a:schemeClr val="lt1"/>
-          </a:fontRef>
-        </p:style>
-        <p:txBody>
-          <a:bodyPr wrap="square" rtlCol="0" anchor="ctr">
-            <a:noAutofit/>
-          </a:bodyPr>
-          <a:lstStyle/>
-          <a:p>
-            <a:pPr marL="0" marR="0" lvl="0" indent="0" algn="ctr" defTabSz="914400" rtl="0" eaLnBrk="1" fontAlgn="auto" latinLnBrk="0" hangingPunct="1">
-              <a:lnSpc>
-                <a:spcPct val="100000"/>
-              </a:lnSpc>
-              <a:spcBef>
-                <a:spcPts val="0"/>
-              </a:spcBef>
-              <a:spcAft>
-                <a:spcPts val="0"/>
-              </a:spcAft>
-              <a:buClrTx/>
-              <a:buSzTx/>
-              <a:buFontTx/>
-              <a:buNone/>
-              <a:tabLst/>
-              <a:defRPr/>
-            </a:pPr>
-            <a:endParaRPr kumimoji="0" lang="en-US" sz="1800" b="0" i="0" u="none" strike="noStrike" kern="1200" cap="none" spc="0" normalizeH="0" baseline="0" noProof="0">
-              <a:ln>
-                <a:noFill/>
-              </a:ln>
-              <a:solidFill>
-                <a:prstClr val="white"/>
-              </a:solidFill>
-              <a:effectLst/>
-              <a:uLnTx/>
-              <a:uFillTx/>
-              <a:latin typeface="Calibri" panose="020F0502020204030204"/>
-              <a:ea typeface="+mn-ea"/>
-              <a:cs typeface="+mn-cs"/>
-            </a:endParaRPr>
-          </a:p>
-        </p:txBody>
-      </p:sp>
-      <p:sp>
-        <p:nvSpPr>
-          <p:cNvPr id="2" name="Title 1">
-            <a:extLst>
-              <a:ext uri="{FF2B5EF4-FFF2-40B4-BE49-F238E27FC236}">
-                <a16:creationId xmlns:a16="http://schemas.microsoft.com/office/drawing/2014/main" id="{82B8937C-E6AD-4351-B7AE-BA0694E8CCD6}"/>
-              </a:ext>
-            </a:extLst>
-          </p:cNvPr>
-          <p:cNvSpPr>
-            <a:spLocks noGrp="1"/>
-          </p:cNvSpPr>
-          <p:nvPr>
-            <p:ph type="title"/>
-          </p:nvPr>
-        </p:nvSpPr>
-        <p:spPr>
-          <a:xfrm>
-            <a:off x="477981" y="1122363"/>
-            <a:ext cx="4023360" cy="3204134"/>
-          </a:xfrm>
-        </p:spPr>
-        <p:txBody>
-          <a:bodyPr vert="horz" lIns="91440" tIns="45720" rIns="91440" bIns="45720" rtlCol="0" anchor="b">
-            <a:normAutofit/>
-          </a:bodyPr>
-          <a:lstStyle/>
-          <a:p>
-            <a:r>
-              <a:rPr lang="en-US" sz="4800"/>
-              <a:t>Property Type</a:t>
-            </a:r>
-          </a:p>
-        </p:txBody>
-      </p:sp>
-      <p:sp>
-        <p:nvSpPr>
-          <p:cNvPr id="20" name="Rectangle 19">
-            <a:extLst>
-              <a:ext uri="{FF2B5EF4-FFF2-40B4-BE49-F238E27FC236}">
-                <a16:creationId xmlns:a16="http://schemas.microsoft.com/office/drawing/2014/main" id="{AF2F604E-43BE-4DC3-B983-E071523364F8}"/>
-              </a:ext>
-              <a:ext uri="{C183D7F6-B498-43B3-948B-1728B52AA6E4}">
-                <adec:decorative xmlns:adec="http://schemas.microsoft.com/office/drawing/2017/decorative" val="1"/>
-              </a:ext>
-            </a:extLst>
-          </p:cNvPr>
-          <p:cNvSpPr>
-            <a:spLocks noGrp="1" noRot="1" noChangeAspect="1" noMove="1" noResize="1" noEditPoints="1" noAdjustHandles="1" noChangeArrowheads="1" noChangeShapeType="1" noTextEdit="1"/>
-          </p:cNvSpPr>
-          <p:nvPr>
-            <p:extLst>
-              <p:ext uri="{386F3935-93C4-4BCD-93E2-E3B085C9AB24}">
-                <p16:designElem xmlns:p16="http://schemas.microsoft.com/office/powerpoint/2015/main" val="1"/>
-              </p:ext>
-            </p:extLst>
-          </p:nvPr>
-        </p:nvSpPr>
-        <p:spPr>
-          <a:xfrm rot="5400000">
-            <a:off x="759921" y="346791"/>
-            <a:ext cx="146304" cy="704088"/>
-          </a:xfrm>
-          <a:prstGeom prst="rect">
-            <a:avLst/>
-          </a:prstGeom>
-          <a:solidFill>
-            <a:schemeClr val="accent1"/>
-          </a:solidFill>
-          <a:ln>
-            <a:noFill/>
-          </a:ln>
-        </p:spPr>
-        <p:style>
-          <a:lnRef idx="2">
-            <a:schemeClr val="accent1">
-              <a:shade val="50000"/>
-            </a:schemeClr>
-          </a:lnRef>
-          <a:fillRef idx="1">
-            <a:schemeClr val="accent1"/>
-          </a:fillRef>
-          <a:effectRef idx="0">
-            <a:schemeClr val="accent1"/>
-          </a:effectRef>
-          <a:fontRef idx="minor">
-            <a:schemeClr val="lt1"/>
-          </a:fontRef>
-        </p:style>
-        <p:txBody>
-          <a:bodyPr rtlCol="0" anchor="ctr"/>
-          <a:lstStyle/>
-          <a:p>
-            <a:pPr marL="0" marR="0" lvl="0" indent="0" algn="ctr" defTabSz="914400" rtl="0" eaLnBrk="1" fontAlgn="auto" latinLnBrk="0" hangingPunct="1">
-              <a:lnSpc>
-                <a:spcPct val="100000"/>
-              </a:lnSpc>
-              <a:spcBef>
-                <a:spcPts val="0"/>
-              </a:spcBef>
-              <a:spcAft>
-                <a:spcPts val="0"/>
-              </a:spcAft>
-              <a:buClrTx/>
-              <a:buSzTx/>
-              <a:buFontTx/>
-              <a:buNone/>
-              <a:tabLst/>
-              <a:defRPr/>
-            </a:pPr>
-            <a:endParaRPr kumimoji="0" lang="en-US" sz="1800" b="0" i="0" u="none" strike="noStrike" kern="1200" cap="none" spc="0" normalizeH="0" baseline="0" noProof="0">
-              <a:ln>
-                <a:noFill/>
-              </a:ln>
-              <a:solidFill>
-                <a:prstClr val="white"/>
-              </a:solidFill>
-              <a:effectLst/>
-              <a:uLnTx/>
-              <a:uFillTx/>
-              <a:latin typeface="Calibri" panose="020F0502020204030204"/>
-              <a:ea typeface="+mn-ea"/>
-              <a:cs typeface="+mn-cs"/>
-            </a:endParaRPr>
-          </a:p>
-        </p:txBody>
-      </p:sp>
-      <p:sp>
-        <p:nvSpPr>
-          <p:cNvPr id="22" name="Rectangle 21">
-            <a:extLst>
-              <a:ext uri="{FF2B5EF4-FFF2-40B4-BE49-F238E27FC236}">
-                <a16:creationId xmlns:a16="http://schemas.microsoft.com/office/drawing/2014/main" id="{08C9B587-E65E-4B52-B37C-ABEBB6E87928}"/>
-              </a:ext>
-              <a:ext uri="{C183D7F6-B498-43B3-948B-1728B52AA6E4}">
-                <adec:decorative xmlns:adec="http://schemas.microsoft.com/office/drawing/2017/decorative" val="1"/>
-              </a:ext>
-            </a:extLst>
-          </p:cNvPr>
-          <p:cNvSpPr>
-            <a:spLocks noGrp="1" noRot="1" noChangeAspect="1" noMove="1" noResize="1" noEditPoints="1" noAdjustHandles="1" noChangeArrowheads="1" noChangeShapeType="1" noTextEdit="1"/>
-          </p:cNvSpPr>
-          <p:nvPr>
-            <p:extLst>
-              <p:ext uri="{386F3935-93C4-4BCD-93E2-E3B085C9AB24}">
-                <p16:designElem xmlns:p16="http://schemas.microsoft.com/office/powerpoint/2015/main" val="1"/>
-              </p:ext>
-            </p:extLst>
-          </p:nvPr>
-        </p:nvSpPr>
-        <p:spPr>
-          <a:xfrm>
-            <a:off x="481029" y="4546920"/>
-            <a:ext cx="4023360" cy="18288"/>
-          </a:xfrm>
-          <a:prstGeom prst="rect">
-            <a:avLst/>
-          </a:prstGeom>
-          <a:solidFill>
-            <a:schemeClr val="tx2">
-              <a:lumMod val="25000"/>
-              <a:lumOff val="75000"/>
-            </a:schemeClr>
-          </a:solidFill>
-          <a:ln w="3175">
-            <a:noFill/>
-          </a:ln>
-          <a:effectLst/>
-        </p:spPr>
-        <p:style>
-          <a:lnRef idx="2">
-            <a:schemeClr val="accent1">
-              <a:shade val="50000"/>
-            </a:schemeClr>
-          </a:lnRef>
-          <a:fillRef idx="1">
-            <a:schemeClr val="accent1"/>
-          </a:fillRef>
-          <a:effectRef idx="0">
-            <a:schemeClr val="accent1"/>
-          </a:effectRef>
-          <a:fontRef idx="minor">
-            <a:schemeClr val="lt1"/>
-          </a:fontRef>
-        </p:style>
-        <p:txBody>
-          <a:bodyPr rtlCol="0" anchor="ctr"/>
-          <a:lstStyle/>
-          <a:p>
-            <a:pPr marL="0" marR="0" lvl="0" indent="0" algn="ctr" defTabSz="914400" rtl="0" eaLnBrk="1" fontAlgn="auto" latinLnBrk="0" hangingPunct="1">
-              <a:lnSpc>
-                <a:spcPct val="100000"/>
-              </a:lnSpc>
-              <a:spcBef>
-                <a:spcPts val="0"/>
-              </a:spcBef>
-              <a:spcAft>
-                <a:spcPts val="0"/>
-              </a:spcAft>
-              <a:buClrTx/>
-              <a:buSzTx/>
-              <a:buFontTx/>
-              <a:buNone/>
-              <a:tabLst/>
-              <a:defRPr/>
-            </a:pPr>
-            <a:endParaRPr kumimoji="0" lang="en-US" sz="1800" b="0" i="0" u="none" strike="noStrike" kern="1200" cap="none" spc="0" normalizeH="0" baseline="0" noProof="0">
-              <a:ln>
-                <a:noFill/>
-              </a:ln>
-              <a:solidFill>
-                <a:prstClr val="white"/>
-              </a:solidFill>
-              <a:effectLst/>
-              <a:uLnTx/>
-              <a:uFillTx/>
-              <a:latin typeface="Calibri" panose="020F0502020204030204"/>
-              <a:ea typeface="+mn-ea"/>
-              <a:cs typeface="+mn-cs"/>
-            </a:endParaRPr>
-          </a:p>
-        </p:txBody>
-      </p:sp>
-      <p:pic>
-        <p:nvPicPr>
-          <p:cNvPr id="5" name="Content Placeholder 4" descr="Chart, bar chart&#10;&#10;Description automatically generated">
-            <a:extLst>
-              <a:ext uri="{FF2B5EF4-FFF2-40B4-BE49-F238E27FC236}">
-                <a16:creationId xmlns:a16="http://schemas.microsoft.com/office/drawing/2014/main" id="{B65E60FD-1ED1-4200-893A-1A54345B98CF}"/>
-              </a:ext>
-            </a:extLst>
-          </p:cNvPr>
-          <p:cNvPicPr>
-            <a:picLocks noGrp="1" noChangeAspect="1"/>
-          </p:cNvPicPr>
-          <p:nvPr>
-            <p:ph idx="1"/>
-          </p:nvPr>
-        </p:nvPicPr>
-        <p:blipFill>
-          <a:blip r:embed="rId2">
-            <a:extLst>
-              <a:ext uri="{28A0092B-C50C-407E-A947-70E740481C1C}">
-                <a14:useLocalDpi xmlns:a14="http://schemas.microsoft.com/office/drawing/2010/main" val="0"/>
-              </a:ext>
-            </a:extLst>
-          </a:blip>
-          <a:stretch>
-            <a:fillRect/>
-          </a:stretch>
-        </p:blipFill>
-        <p:spPr>
-          <a:xfrm>
-            <a:off x="5604752" y="625684"/>
-            <a:ext cx="6028044" cy="5455380"/>
-          </a:xfrm>
-          <a:prstGeom prst="rect">
-            <a:avLst/>
-          </a:prstGeom>
-        </p:spPr>
-      </p:pic>
-    </p:spTree>
-    <p:extLst>
-      <p:ext uri="{BB962C8B-B14F-4D97-AF65-F5344CB8AC3E}">
-        <p14:creationId xmlns:p14="http://schemas.microsoft.com/office/powerpoint/2010/main" val="2441689212"/>
-      </p:ext>
-    </p:extLst>
-  </p:cSld>
-  <p:clrMapOvr>
-    <a:masterClrMapping/>
-  </p:clrMapOvr>
-</p:sld>
-</file>
-
-<file path=ppt/slides/slide9.xml><?xml version="1.0" encoding="utf-8"?>
-<p:sld xmlns:a="http://schemas.openxmlformats.org/drawingml/2006/main" xmlns:r="http://schemas.openxmlformats.org/officeDocument/2006/relationships" xmlns:p="http://schemas.openxmlformats.org/presentationml/2006/main">
-  <p:cSld>
-    <p:bg>
-      <p:bgPr>
-        <a:solidFill>
-          <a:schemeClr val="bg1"/>
-        </a:solidFill>
-        <a:effectLst/>
-      </p:bgPr>
-    </p:bg>
-    <p:spTree>
-      <p:nvGrpSpPr>
-        <p:cNvPr id="1" name=""/>
-        <p:cNvGrpSpPr/>
-        <p:nvPr/>
-      </p:nvGrpSpPr>
-      <p:grpSpPr>
-        <a:xfrm>
-          <a:off x="0" y="0"/>
-          <a:ext cx="0" cy="0"/>
-          <a:chOff x="0" y="0"/>
-          <a:chExt cx="0" cy="0"/>
-        </a:xfrm>
-      </p:grpSpPr>
-      <p:sp useBgFill="1">
-        <p:nvSpPr>
-          <p:cNvPr id="43" name="Rectangle 42">
-            <a:extLst>
-              <a:ext uri="{FF2B5EF4-FFF2-40B4-BE49-F238E27FC236}">
-                <a16:creationId xmlns:a16="http://schemas.microsoft.com/office/drawing/2014/main" id="{2550BE34-C2B8-49B8-8519-67A8CAD51AE9}"/>
-              </a:ext>
-              <a:ext uri="{C183D7F6-B498-43B3-948B-1728B52AA6E4}">
-                <adec:decorative xmlns:adec="http://schemas.microsoft.com/office/drawing/2017/decorative" val="1"/>
-              </a:ext>
-            </a:extLst>
-          </p:cNvPr>
-          <p:cNvSpPr>
-            <a:spLocks noGrp="1" noRot="1" noChangeAspect="1" noMove="1" noResize="1" noEditPoints="1" noAdjustHandles="1" noChangeArrowheads="1" noChangeShapeType="1" noTextEdit="1"/>
-          </p:cNvSpPr>
-          <p:nvPr>
-            <p:extLst>
-              <p:ext uri="{386F3935-93C4-4BCD-93E2-E3B085C9AB24}">
-                <p16:designElem xmlns:p16="http://schemas.microsoft.com/office/powerpoint/2015/main" val="1"/>
-              </p:ext>
-            </p:extLst>
-          </p:nvPr>
-        </p:nvSpPr>
-        <p:spPr>
-          <a:xfrm>
-            <a:off x="0" y="0"/>
-            <a:ext cx="12192000" cy="6858000"/>
-          </a:xfrm>
-          <a:prstGeom prst="rect">
-            <a:avLst/>
-          </a:prstGeom>
-          <a:ln>
-            <a:noFill/>
-          </a:ln>
-        </p:spPr>
-        <p:style>
-          <a:lnRef idx="2">
-            <a:schemeClr val="accent1">
-              <a:shade val="50000"/>
-            </a:schemeClr>
-          </a:lnRef>
-          <a:fillRef idx="1">
-            <a:schemeClr val="accent1"/>
-          </a:fillRef>
-          <a:effectRef idx="0">
-            <a:schemeClr val="accent1"/>
-          </a:effectRef>
-          <a:fontRef idx="minor">
-            <a:schemeClr val="lt1"/>
-          </a:fontRef>
-        </p:style>
-        <p:txBody>
-          <a:bodyPr rtlCol="0" anchor="ctr"/>
-          <a:lstStyle/>
-          <a:p>
-            <a:pPr algn="ctr"/>
-            <a:endParaRPr lang="en-US"/>
-          </a:p>
-        </p:txBody>
-      </p:sp>
-      <p:sp useBgFill="1">
-        <p:nvSpPr>
-          <p:cNvPr id="45" name="Rectangle 44">
-            <a:extLst>
-              <a:ext uri="{FF2B5EF4-FFF2-40B4-BE49-F238E27FC236}">
-                <a16:creationId xmlns:a16="http://schemas.microsoft.com/office/drawing/2014/main" id="{A7457DD9-5A45-400A-AB4B-4B4EDECA25F1}"/>
+                <a16:creationId xmlns:a16="http://schemas.microsoft.com/office/drawing/2014/main" id="{0990C621-3B8B-4820-8328-D47EF7CE823C}"/>
               </a:ext>
               <a:ext uri="{C183D7F6-B498-43B3-948B-1728B52AA6E4}">
                 <adec:decorative xmlns:adec="http://schemas.microsoft.com/office/drawing/2017/decorative" val="1"/>
@@ -23705,7 +23487,7 @@
           <p:cNvPr id="2" name="Title 1">
             <a:extLst>
               <a:ext uri="{FF2B5EF4-FFF2-40B4-BE49-F238E27FC236}">
-                <a16:creationId xmlns:a16="http://schemas.microsoft.com/office/drawing/2014/main" id="{785B5E1D-06A2-4A57-ACE0-34D4044AAE28}"/>
+                <a16:creationId xmlns:a16="http://schemas.microsoft.com/office/drawing/2014/main" id="{82B8937C-E6AD-4351-B7AE-BA0694E8CCD6}"/>
               </a:ext>
             </a:extLst>
           </p:cNvPr>
@@ -23718,29 +23500,29 @@
         </p:nvSpPr>
         <p:spPr>
           <a:xfrm>
-            <a:off x="1046746" y="586822"/>
-            <a:ext cx="3537285" cy="1645920"/>
+            <a:off x="1051560" y="586822"/>
+            <a:ext cx="3538728" cy="1645920"/>
           </a:xfrm>
         </p:spPr>
         <p:txBody>
-          <a:bodyPr>
+          <a:bodyPr vert="horz" lIns="91440" tIns="45720" rIns="91440" bIns="45720" rtlCol="0">
             <a:normAutofit/>
           </a:bodyPr>
           <a:lstStyle/>
           <a:p>
             <a:r>
               <a:rPr lang="en-US" sz="3200"/>
-              <a:t>Impact of Built Year</a:t>
+              <a:t>Property Type</a:t>
             </a:r>
           </a:p>
         </p:txBody>
       </p:sp>
       <p:sp>
         <p:nvSpPr>
-          <p:cNvPr id="47" name="Rectangle 46">
+          <p:cNvPr id="4118" name="Rectangle 85">
             <a:extLst>
               <a:ext uri="{FF2B5EF4-FFF2-40B4-BE49-F238E27FC236}">
-                <a16:creationId xmlns:a16="http://schemas.microsoft.com/office/drawing/2014/main" id="{441CF7D6-A660-431A-B0BB-140A0D5556B6}"/>
+                <a16:creationId xmlns:a16="http://schemas.microsoft.com/office/drawing/2014/main" id="{C1A2385B-1D2A-4E17-84FA-6CB7F0AAE473}"/>
               </a:ext>
               <a:ext uri="{C183D7F6-B498-43B3-948B-1728B52AA6E4}">
                 <adec:decorative xmlns:adec="http://schemas.microsoft.com/office/drawing/2017/decorative" val="1"/>
@@ -23829,10 +23611,10 @@
       </p:sp>
       <p:sp>
         <p:nvSpPr>
-          <p:cNvPr id="49" name="Rectangle 48">
+          <p:cNvPr id="87" name="Rectangle 86">
             <a:extLst>
               <a:ext uri="{FF2B5EF4-FFF2-40B4-BE49-F238E27FC236}">
-                <a16:creationId xmlns:a16="http://schemas.microsoft.com/office/drawing/2014/main" id="{0570A85B-3810-4F95-97B0-CBF4CCDB381C}"/>
+                <a16:creationId xmlns:a16="http://schemas.microsoft.com/office/drawing/2014/main" id="{5E791F2F-79DB-4CC0-9FA1-001E3E91E8B7}"/>
               </a:ext>
               <a:ext uri="{C183D7F6-B498-43B3-948B-1728B52AA6E4}">
                 <adec:decorative xmlns:adec="http://schemas.microsoft.com/office/drawing/2017/decorative" val="1"/>
@@ -23925,10 +23707,10 @@
       </p:sp>
       <p:sp>
         <p:nvSpPr>
-          <p:cNvPr id="9" name="Content Placeholder 8">
+          <p:cNvPr id="4104" name="Content Placeholder 4103">
             <a:extLst>
               <a:ext uri="{FF2B5EF4-FFF2-40B4-BE49-F238E27FC236}">
-                <a16:creationId xmlns:a16="http://schemas.microsoft.com/office/drawing/2014/main" id="{904EC0C0-693A-4C56-87D1-125BE8FA542A}"/>
+                <a16:creationId xmlns:a16="http://schemas.microsoft.com/office/drawing/2014/main" id="{62D21466-7860-46B4-AF3A-7B1851C8EA83}"/>
               </a:ext>
             </a:extLst>
           </p:cNvPr>
@@ -23941,8 +23723,8 @@
         </p:nvSpPr>
         <p:spPr>
           <a:xfrm>
-            <a:off x="5351164" y="586822"/>
-            <a:ext cx="6002636" cy="1645920"/>
+            <a:off x="5349240" y="586822"/>
+            <a:ext cx="6007608" cy="1645920"/>
           </a:xfrm>
         </p:spPr>
         <p:txBody>
@@ -23952,29 +23734,26 @@
           <a:lstStyle/>
           <a:p>
             <a:r>
-              <a:rPr lang="en-US" sz="1800"/>
-              <a:t>70 % of homes in early 1800’s to 1900’s were in Manhattan or Brooklyn</a:t>
+              <a:rPr lang="en-US" sz="1800" dirty="0"/>
+              <a:t>Due to low sample size for Townhouse and Mixed Use properties, we can have skewed data, as few homes might not give us the whole picture for prices for this property type.</a:t>
             </a:r>
           </a:p>
           <a:p>
-            <a:r>
-              <a:rPr lang="en-US" sz="1800"/>
-              <a:t>Recent Homes see an uptick with over 50% of homes in lower priced boroughs </a:t>
-            </a:r>
+            <a:endParaRPr lang="en-US" sz="1800" dirty="0"/>
           </a:p>
         </p:txBody>
       </p:sp>
       <p:pic>
         <p:nvPicPr>
-          <p:cNvPr id="5" name="Content Placeholder 4" descr="Chart, bar chart, histogram&#10;&#10;Description automatically generated">
+          <p:cNvPr id="4102" name="Picture 6">
             <a:extLst>
               <a:ext uri="{FF2B5EF4-FFF2-40B4-BE49-F238E27FC236}">
-                <a16:creationId xmlns:a16="http://schemas.microsoft.com/office/drawing/2014/main" id="{967A56D6-9836-4EF8-9969-7E277C0F5BC6}"/>
+                <a16:creationId xmlns:a16="http://schemas.microsoft.com/office/drawing/2014/main" id="{7E98BD21-3938-46AD-9908-327823BE471A}"/>
               </a:ext>
             </a:extLst>
           </p:cNvPr>
           <p:cNvPicPr>
-            <a:picLocks noChangeAspect="1"/>
+            <a:picLocks noChangeAspect="1" noChangeArrowheads="1"/>
           </p:cNvPicPr>
           <p:nvPr/>
         </p:nvPicPr>
@@ -23990,20 +23769,76 @@
             <a:fillRect/>
           </a:stretch>
         </p:blipFill>
-        <p:spPr>
+        <p:spPr bwMode="auto">
           <a:xfrm>
-            <a:off x="963256" y="2499586"/>
-            <a:ext cx="10390544" cy="4286101"/>
+            <a:off x="1521145" y="2729396"/>
+            <a:ext cx="4239369" cy="4154793"/>
           </a:xfrm>
           <a:prstGeom prst="rect">
             <a:avLst/>
           </a:prstGeom>
+          <a:noFill/>
+          <a:extLst>
+            <a:ext uri="{909E8E84-426E-40DD-AFC4-6F175D3DCCD1}">
+              <a14:hiddenFill xmlns:a14="http://schemas.microsoft.com/office/drawing/2010/main">
+                <a:solidFill>
+                  <a:srgbClr val="FFFFFF"/>
+                </a:solidFill>
+              </a14:hiddenFill>
+            </a:ext>
+          </a:extLst>
+        </p:spPr>
+      </p:pic>
+      <p:pic>
+        <p:nvPicPr>
+          <p:cNvPr id="4098" name="Picture 2">
+            <a:extLst>
+              <a:ext uri="{FF2B5EF4-FFF2-40B4-BE49-F238E27FC236}">
+                <a16:creationId xmlns:a16="http://schemas.microsoft.com/office/drawing/2014/main" id="{10D103AF-105E-4F02-A998-DF00A11FAF38}"/>
+              </a:ext>
+            </a:extLst>
+          </p:cNvPr>
+          <p:cNvPicPr>
+            <a:picLocks noChangeAspect="1" noChangeArrowheads="1"/>
+          </p:cNvPicPr>
+          <p:nvPr/>
+        </p:nvPicPr>
+        <p:blipFill>
+          <a:blip r:embed="rId3">
+            <a:extLst>
+              <a:ext uri="{28A0092B-C50C-407E-A947-70E740481C1C}">
+                <a14:useLocalDpi xmlns:a14="http://schemas.microsoft.com/office/drawing/2010/main" val="0"/>
+              </a:ext>
+            </a:extLst>
+          </a:blip>
+          <a:stretch>
+            <a:fillRect/>
+          </a:stretch>
+        </p:blipFill>
+        <p:spPr bwMode="auto">
+          <a:xfrm>
+            <a:off x="6431486" y="2729396"/>
+            <a:ext cx="4357636" cy="4150649"/>
+          </a:xfrm>
+          <a:prstGeom prst="rect">
+            <a:avLst/>
+          </a:prstGeom>
+          <a:noFill/>
+          <a:extLst>
+            <a:ext uri="{909E8E84-426E-40DD-AFC4-6F175D3DCCD1}">
+              <a14:hiddenFill xmlns:a14="http://schemas.microsoft.com/office/drawing/2010/main">
+                <a:solidFill>
+                  <a:srgbClr val="FFFFFF"/>
+                </a:solidFill>
+              </a14:hiddenFill>
+            </a:ext>
+          </a:extLst>
         </p:spPr>
       </p:pic>
     </p:spTree>
     <p:extLst>
       <p:ext uri="{BB962C8B-B14F-4D97-AF65-F5344CB8AC3E}">
-        <p14:creationId xmlns:p14="http://schemas.microsoft.com/office/powerpoint/2010/main" val="3044482638"/>
+        <p14:creationId xmlns:p14="http://schemas.microsoft.com/office/powerpoint/2010/main" val="2441689212"/>
       </p:ext>
     </p:extLst>
   </p:cSld>

</xml_diff>